<commit_message>
day 3 slides updated
</commit_message>
<xml_diff>
--- a/Class_Materials/Week_2/Day_3/ISBPM w2d3.pptx
+++ b/Class_Materials/Week_2/Day_3/ISBPM w2d3.pptx
@@ -5,23 +5,33 @@
     <p:sldMasterId id="2147483810" r:id="rId1"/>
   </p:sldMasterIdLst>
   <p:notesMasterIdLst>
-    <p:notesMasterId r:id="rId16"/>
+    <p:notesMasterId r:id="rId26"/>
   </p:notesMasterIdLst>
   <p:sldIdLst>
     <p:sldId id="256" r:id="rId2"/>
     <p:sldId id="257" r:id="rId3"/>
     <p:sldId id="278" r:id="rId4"/>
-    <p:sldId id="286" r:id="rId5"/>
-    <p:sldId id="287" r:id="rId6"/>
-    <p:sldId id="297" r:id="rId7"/>
-    <p:sldId id="296" r:id="rId8"/>
-    <p:sldId id="280" r:id="rId9"/>
-    <p:sldId id="277" r:id="rId10"/>
-    <p:sldId id="281" r:id="rId11"/>
-    <p:sldId id="260" r:id="rId12"/>
-    <p:sldId id="274" r:id="rId13"/>
-    <p:sldId id="275" r:id="rId14"/>
-    <p:sldId id="276" r:id="rId15"/>
+    <p:sldId id="299" r:id="rId5"/>
+    <p:sldId id="286" r:id="rId6"/>
+    <p:sldId id="287" r:id="rId7"/>
+    <p:sldId id="302" r:id="rId8"/>
+    <p:sldId id="303" r:id="rId9"/>
+    <p:sldId id="298" r:id="rId10"/>
+    <p:sldId id="300" r:id="rId11"/>
+    <p:sldId id="305" r:id="rId12"/>
+    <p:sldId id="306" r:id="rId13"/>
+    <p:sldId id="301" r:id="rId14"/>
+    <p:sldId id="304" r:id="rId15"/>
+    <p:sldId id="307" r:id="rId16"/>
+    <p:sldId id="297" r:id="rId17"/>
+    <p:sldId id="296" r:id="rId18"/>
+    <p:sldId id="280" r:id="rId19"/>
+    <p:sldId id="277" r:id="rId20"/>
+    <p:sldId id="281" r:id="rId21"/>
+    <p:sldId id="260" r:id="rId22"/>
+    <p:sldId id="274" r:id="rId23"/>
+    <p:sldId id="275" r:id="rId24"/>
+    <p:sldId id="276" r:id="rId25"/>
   </p:sldIdLst>
   <p:sldSz cx="12192000" cy="6858000"/>
   <p:notesSz cx="6858000" cy="9144000"/>
@@ -131,7 +141,7 @@
 <file path=ppt/revisionInfo.xml><?xml version="1.0" encoding="utf-8"?>
 <p1510:revInfo xmlns:a="http://schemas.openxmlformats.org/drawingml/2006/main" xmlns:r="http://schemas.openxmlformats.org/officeDocument/2006/relationships" xmlns:p1510="http://schemas.microsoft.com/office/powerpoint/2015/10/main">
   <p1510:revLst>
-    <p1510:client id="{75F37481-841B-40AD-A891-4A29A46DEAFB}" v="2" dt="2023-04-17T00:08:52.373"/>
+    <p1510:client id="{75F37481-841B-40AD-A891-4A29A46DEAFB}" v="19" dt="2023-04-17T17:21:31.484"/>
   </p1510:revLst>
 </p1510:revInfo>
 </file>
@@ -1712,8 +1722,8 @@
   </pc:docChgLst>
   <pc:docChgLst>
     <pc:chgData name="Emily Crose" userId="5a1598ef78992c55" providerId="LiveId" clId="{75F37481-841B-40AD-A891-4A29A46DEAFB}"/>
-    <pc:docChg chg="custSel addSld modSld">
-      <pc:chgData name="Emily Crose" userId="5a1598ef78992c55" providerId="LiveId" clId="{75F37481-841B-40AD-A891-4A29A46DEAFB}" dt="2023-04-17T00:09:46.376" v="29" actId="26606"/>
+    <pc:docChg chg="undo custSel addSld modSld sldOrd">
+      <pc:chgData name="Emily Crose" userId="5a1598ef78992c55" providerId="LiveId" clId="{75F37481-841B-40AD-A891-4A29A46DEAFB}" dt="2023-04-17T17:23:45.574" v="1239" actId="20577"/>
       <pc:docMkLst>
         <pc:docMk/>
       </pc:docMkLst>
@@ -1985,14 +1995,14 @@
           </ac:cxnSpMkLst>
         </pc:cxnChg>
       </pc:sldChg>
-      <pc:sldChg chg="modSp add">
-        <pc:chgData name="Emily Crose" userId="5a1598ef78992c55" providerId="LiveId" clId="{75F37481-841B-40AD-A891-4A29A46DEAFB}" dt="2023-04-17T00:08:52.373" v="16"/>
+      <pc:sldChg chg="modSp add mod">
+        <pc:chgData name="Emily Crose" userId="5a1598ef78992c55" providerId="LiveId" clId="{75F37481-841B-40AD-A891-4A29A46DEAFB}" dt="2023-04-17T14:11:18.971" v="193" actId="20577"/>
         <pc:sldMkLst>
           <pc:docMk/>
           <pc:sldMk cId="3076984293" sldId="280"/>
         </pc:sldMkLst>
         <pc:spChg chg="mod">
-          <ac:chgData name="Emily Crose" userId="5a1598ef78992c55" providerId="LiveId" clId="{75F37481-841B-40AD-A891-4A29A46DEAFB}" dt="2023-04-17T00:08:52.373" v="16"/>
+          <ac:chgData name="Emily Crose" userId="5a1598ef78992c55" providerId="LiveId" clId="{75F37481-841B-40AD-A891-4A29A46DEAFB}" dt="2023-04-17T14:11:18.971" v="193" actId="20577"/>
           <ac:spMkLst>
             <pc:docMk/>
             <pc:sldMk cId="3076984293" sldId="280"/>
@@ -2045,8 +2055,8 @@
           <pc:sldMk cId="2221949335" sldId="287"/>
         </pc:sldMkLst>
       </pc:sldChg>
-      <pc:sldChg chg="modSp add">
-        <pc:chgData name="Emily Crose" userId="5a1598ef78992c55" providerId="LiveId" clId="{75F37481-841B-40AD-A891-4A29A46DEAFB}" dt="2023-04-17T00:08:52.373" v="16"/>
+      <pc:sldChg chg="addSp modSp add">
+        <pc:chgData name="Emily Crose" userId="5a1598ef78992c55" providerId="LiveId" clId="{75F37481-841B-40AD-A891-4A29A46DEAFB}" dt="2023-04-17T14:08:24.364" v="176"/>
         <pc:sldMkLst>
           <pc:docMk/>
           <pc:sldMk cId="2437315508" sldId="296"/>
@@ -2059,21 +2069,483 @@
             <ac:spMk id="2" creationId="{B401AA53-CB3A-8EF2-7C9D-70B19BF8F561}"/>
           </ac:spMkLst>
         </pc:spChg>
+        <pc:picChg chg="add mod">
+          <ac:chgData name="Emily Crose" userId="5a1598ef78992c55" providerId="LiveId" clId="{75F37481-841B-40AD-A891-4A29A46DEAFB}" dt="2023-04-17T14:08:24.364" v="176"/>
+          <ac:picMkLst>
+            <pc:docMk/>
+            <pc:sldMk cId="2437315508" sldId="296"/>
+            <ac:picMk id="3" creationId="{5D5F0843-A33F-DC5E-B0B4-E94D73EFBE9F}"/>
+          </ac:picMkLst>
+        </pc:picChg>
       </pc:sldChg>
-      <pc:sldChg chg="modSp add">
-        <pc:chgData name="Emily Crose" userId="5a1598ef78992c55" providerId="LiveId" clId="{75F37481-841B-40AD-A891-4A29A46DEAFB}" dt="2023-04-17T00:08:52.373" v="16"/>
+      <pc:sldChg chg="addSp delSp modSp add mod setBg setClrOvrMap">
+        <pc:chgData name="Emily Crose" userId="5a1598ef78992c55" providerId="LiveId" clId="{75F37481-841B-40AD-A891-4A29A46DEAFB}" dt="2023-04-17T14:10:51.332" v="185" actId="26606"/>
         <pc:sldMkLst>
           <pc:docMk/>
           <pc:sldMk cId="2559449484" sldId="297"/>
         </pc:sldMkLst>
         <pc:spChg chg="mod">
-          <ac:chgData name="Emily Crose" userId="5a1598ef78992c55" providerId="LiveId" clId="{75F37481-841B-40AD-A891-4A29A46DEAFB}" dt="2023-04-17T00:08:52.373" v="16"/>
+          <ac:chgData name="Emily Crose" userId="5a1598ef78992c55" providerId="LiveId" clId="{75F37481-841B-40AD-A891-4A29A46DEAFB}" dt="2023-04-17T14:10:51.332" v="185" actId="26606"/>
           <ac:spMkLst>
             <pc:docMk/>
             <pc:sldMk cId="2559449484" sldId="297"/>
             <ac:spMk id="2" creationId="{21BF4D03-BD03-DAC4-BD45-155F165873FF}"/>
           </ac:spMkLst>
         </pc:spChg>
+        <pc:spChg chg="add del">
+          <ac:chgData name="Emily Crose" userId="5a1598ef78992c55" providerId="LiveId" clId="{75F37481-841B-40AD-A891-4A29A46DEAFB}" dt="2023-04-17T14:10:00.573" v="179" actId="26606"/>
+          <ac:spMkLst>
+            <pc:docMk/>
+            <pc:sldMk cId="2559449484" sldId="297"/>
+            <ac:spMk id="9" creationId="{8E482A67-6CD8-49D7-9F85-52ECF99152D0}"/>
+          </ac:spMkLst>
+        </pc:spChg>
+        <pc:spChg chg="add del">
+          <ac:chgData name="Emily Crose" userId="5a1598ef78992c55" providerId="LiveId" clId="{75F37481-841B-40AD-A891-4A29A46DEAFB}" dt="2023-04-17T14:10:00.573" v="179" actId="26606"/>
+          <ac:spMkLst>
+            <pc:docMk/>
+            <pc:sldMk cId="2559449484" sldId="297"/>
+            <ac:spMk id="11" creationId="{418F941B-B7E9-44F2-9A2C-5D35ACF9A678}"/>
+          </ac:spMkLst>
+        </pc:spChg>
+        <pc:spChg chg="add del">
+          <ac:chgData name="Emily Crose" userId="5a1598ef78992c55" providerId="LiveId" clId="{75F37481-841B-40AD-A891-4A29A46DEAFB}" dt="2023-04-17T14:10:00.530" v="178" actId="26606"/>
+          <ac:spMkLst>
+            <pc:docMk/>
+            <pc:sldMk cId="2559449484" sldId="297"/>
+            <ac:spMk id="16" creationId="{DAB482FD-C684-4DAA-AC4C-1739F51A98A0}"/>
+          </ac:spMkLst>
+        </pc:spChg>
+        <pc:spChg chg="add del">
+          <ac:chgData name="Emily Crose" userId="5a1598ef78992c55" providerId="LiveId" clId="{75F37481-841B-40AD-A891-4A29A46DEAFB}" dt="2023-04-17T14:10:51.332" v="185" actId="26606"/>
+          <ac:spMkLst>
+            <pc:docMk/>
+            <pc:sldMk cId="2559449484" sldId="297"/>
+            <ac:spMk id="17" creationId="{608EAA06-5488-416B-B2B2-E55213011012}"/>
+          </ac:spMkLst>
+        </pc:spChg>
+        <pc:picChg chg="add del mod">
+          <ac:chgData name="Emily Crose" userId="5a1598ef78992c55" providerId="LiveId" clId="{75F37481-841B-40AD-A891-4A29A46DEAFB}" dt="2023-04-17T14:08:21.983" v="175" actId="21"/>
+          <ac:picMkLst>
+            <pc:docMk/>
+            <pc:sldMk cId="2559449484" sldId="297"/>
+            <ac:picMk id="4" creationId="{1E1F7FDB-6BA7-4DB1-D0FA-EBCF5D675AED}"/>
+          </ac:picMkLst>
+        </pc:picChg>
+        <pc:picChg chg="add mod">
+          <ac:chgData name="Emily Crose" userId="5a1598ef78992c55" providerId="LiveId" clId="{75F37481-841B-40AD-A891-4A29A46DEAFB}" dt="2023-04-17T14:10:51.332" v="185" actId="26606"/>
+          <ac:picMkLst>
+            <pc:docMk/>
+            <pc:sldMk cId="2559449484" sldId="297"/>
+            <ac:picMk id="6" creationId="{E5274FD0-050A-DF16-2A61-FC89CDDB5226}"/>
+          </ac:picMkLst>
+        </pc:picChg>
+        <pc:picChg chg="add del mod">
+          <ac:chgData name="Emily Crose" userId="5a1598ef78992c55" providerId="LiveId" clId="{75F37481-841B-40AD-A891-4A29A46DEAFB}" dt="2023-04-17T14:10:43.607" v="181" actId="478"/>
+          <ac:picMkLst>
+            <pc:docMk/>
+            <pc:sldMk cId="2559449484" sldId="297"/>
+            <ac:picMk id="13" creationId="{184D646C-02DD-33EE-9440-BFEA7F367D83}"/>
+          </ac:picMkLst>
+        </pc:picChg>
+        <pc:picChg chg="add">
+          <ac:chgData name="Emily Crose" userId="5a1598ef78992c55" providerId="LiveId" clId="{75F37481-841B-40AD-A891-4A29A46DEAFB}" dt="2023-04-17T14:10:51.332" v="185" actId="26606"/>
+          <ac:picMkLst>
+            <pc:docMk/>
+            <pc:sldMk cId="2559449484" sldId="297"/>
+            <ac:picMk id="22" creationId="{08187575-5CB4-477B-AA47-020C6D2A786E}"/>
+          </ac:picMkLst>
+        </pc:picChg>
+        <pc:picChg chg="add">
+          <ac:chgData name="Emily Crose" userId="5a1598ef78992c55" providerId="LiveId" clId="{75F37481-841B-40AD-A891-4A29A46DEAFB}" dt="2023-04-17T14:10:51.332" v="185" actId="26606"/>
+          <ac:picMkLst>
+            <pc:docMk/>
+            <pc:sldMk cId="2559449484" sldId="297"/>
+            <ac:picMk id="24" creationId="{EE585F70-7C5D-424E-A182-39507AF48A0C}"/>
+          </ac:picMkLst>
+        </pc:picChg>
+        <pc:cxnChg chg="add del">
+          <ac:chgData name="Emily Crose" userId="5a1598ef78992c55" providerId="LiveId" clId="{75F37481-841B-40AD-A891-4A29A46DEAFB}" dt="2023-04-17T14:10:00.530" v="178" actId="26606"/>
+          <ac:cxnSpMkLst>
+            <pc:docMk/>
+            <pc:sldMk cId="2559449484" sldId="297"/>
+            <ac:cxnSpMk id="18" creationId="{2DAA738B-EDF5-4694-B25A-3488245BC87C}"/>
+          </ac:cxnSpMkLst>
+        </pc:cxnChg>
+      </pc:sldChg>
+      <pc:sldChg chg="addSp delSp modSp new mod ord setBg modClrScheme delDesignElem chgLayout">
+        <pc:chgData name="Emily Crose" userId="5a1598ef78992c55" providerId="LiveId" clId="{75F37481-841B-40AD-A891-4A29A46DEAFB}" dt="2023-04-17T17:11:25.122" v="715"/>
+        <pc:sldMkLst>
+          <pc:docMk/>
+          <pc:sldMk cId="1818502" sldId="298"/>
+        </pc:sldMkLst>
+        <pc:spChg chg="add mod ord">
+          <ac:chgData name="Emily Crose" userId="5a1598ef78992c55" providerId="LiveId" clId="{75F37481-841B-40AD-A891-4A29A46DEAFB}" dt="2023-04-17T13:54:22.156" v="132" actId="26606"/>
+          <ac:spMkLst>
+            <pc:docMk/>
+            <pc:sldMk cId="1818502" sldId="298"/>
+            <ac:spMk id="2" creationId="{C376F162-0520-4F35-81C7-E55520C03059}"/>
+          </ac:spMkLst>
+        </pc:spChg>
+        <pc:spChg chg="add del mod ord">
+          <ac:chgData name="Emily Crose" userId="5a1598ef78992c55" providerId="LiveId" clId="{75F37481-841B-40AD-A891-4A29A46DEAFB}" dt="2023-04-17T13:54:07.263" v="127" actId="478"/>
+          <ac:spMkLst>
+            <pc:docMk/>
+            <pc:sldMk cId="1818502" sldId="298"/>
+            <ac:spMk id="3" creationId="{09649D18-FED7-B8E8-F3B9-2CFD07D14016}"/>
+          </ac:spMkLst>
+        </pc:spChg>
+        <pc:spChg chg="add del mod">
+          <ac:chgData name="Emily Crose" userId="5a1598ef78992c55" providerId="LiveId" clId="{75F37481-841B-40AD-A891-4A29A46DEAFB}" dt="2023-04-17T13:54:09.146" v="128" actId="478"/>
+          <ac:spMkLst>
+            <pc:docMk/>
+            <pc:sldMk cId="1818502" sldId="298"/>
+            <ac:spMk id="7" creationId="{99657543-365E-840F-9DC6-0CA125E2AD5B}"/>
+          </ac:spMkLst>
+        </pc:spChg>
+        <pc:spChg chg="add del">
+          <ac:chgData name="Emily Crose" userId="5a1598ef78992c55" providerId="LiveId" clId="{75F37481-841B-40AD-A891-4A29A46DEAFB}" dt="2023-04-17T13:52:30.791" v="68" actId="700"/>
+          <ac:spMkLst>
+            <pc:docMk/>
+            <pc:sldMk cId="1818502" sldId="298"/>
+            <ac:spMk id="8" creationId="{608EAA06-5488-416B-B2B2-E55213011012}"/>
+          </ac:spMkLst>
+        </pc:spChg>
+        <pc:spChg chg="add">
+          <ac:chgData name="Emily Crose" userId="5a1598ef78992c55" providerId="LiveId" clId="{75F37481-841B-40AD-A891-4A29A46DEAFB}" dt="2023-04-17T13:54:22.156" v="132" actId="26606"/>
+          <ac:spMkLst>
+            <pc:docMk/>
+            <pc:sldMk cId="1818502" sldId="298"/>
+            <ac:spMk id="15" creationId="{93A46EEB-10AB-4E52-AF22-A848AE9259F9}"/>
+          </ac:spMkLst>
+        </pc:spChg>
+        <pc:picChg chg="add del">
+          <ac:chgData name="Emily Crose" userId="5a1598ef78992c55" providerId="LiveId" clId="{75F37481-841B-40AD-A891-4A29A46DEAFB}" dt="2023-04-17T13:52:16.137" v="65" actId="26606"/>
+          <ac:picMkLst>
+            <pc:docMk/>
+            <pc:sldMk cId="1818502" sldId="298"/>
+            <ac:picMk id="4" creationId="{E3A53F88-ADDF-C495-6A74-08ADDE272E9A}"/>
+          </ac:picMkLst>
+        </pc:picChg>
+        <pc:picChg chg="add del">
+          <ac:chgData name="Emily Crose" userId="5a1598ef78992c55" providerId="LiveId" clId="{75F37481-841B-40AD-A891-4A29A46DEAFB}" dt="2023-04-17T13:52:27.115" v="67" actId="478"/>
+          <ac:picMkLst>
+            <pc:docMk/>
+            <pc:sldMk cId="1818502" sldId="298"/>
+            <ac:picMk id="6" creationId="{F31F01FA-BC6A-3664-54B5-455E91E830D4}"/>
+          </ac:picMkLst>
+        </pc:picChg>
+        <pc:picChg chg="add mod">
+          <ac:chgData name="Emily Crose" userId="5a1598ef78992c55" providerId="LiveId" clId="{75F37481-841B-40AD-A891-4A29A46DEAFB}" dt="2023-04-17T13:54:22.156" v="132" actId="26606"/>
+          <ac:picMkLst>
+            <pc:docMk/>
+            <pc:sldMk cId="1818502" sldId="298"/>
+            <ac:picMk id="10" creationId="{5E7F754C-9343-4B29-6B81-5474334F60B8}"/>
+          </ac:picMkLst>
+        </pc:picChg>
+      </pc:sldChg>
+      <pc:sldChg chg="addSp modSp new mod modClrScheme chgLayout">
+        <pc:chgData name="Emily Crose" userId="5a1598ef78992c55" providerId="LiveId" clId="{75F37481-841B-40AD-A891-4A29A46DEAFB}" dt="2023-04-17T17:23:45.574" v="1239" actId="20577"/>
+        <pc:sldMkLst>
+          <pc:docMk/>
+          <pc:sldMk cId="1671539891" sldId="299"/>
+        </pc:sldMkLst>
+        <pc:spChg chg="mod ord">
+          <ac:chgData name="Emily Crose" userId="5a1598ef78992c55" providerId="LiveId" clId="{75F37481-841B-40AD-A891-4A29A46DEAFB}" dt="2023-04-17T14:11:37.518" v="194" actId="700"/>
+          <ac:spMkLst>
+            <pc:docMk/>
+            <pc:sldMk cId="1671539891" sldId="299"/>
+            <ac:spMk id="2" creationId="{2863F72C-E34F-ACFC-2C46-F6B2C8C20651}"/>
+          </ac:spMkLst>
+        </pc:spChg>
+        <pc:spChg chg="add mod ord">
+          <ac:chgData name="Emily Crose" userId="5a1598ef78992c55" providerId="LiveId" clId="{75F37481-841B-40AD-A891-4A29A46DEAFB}" dt="2023-04-17T17:23:45.574" v="1239" actId="20577"/>
+          <ac:spMkLst>
+            <pc:docMk/>
+            <pc:sldMk cId="1671539891" sldId="299"/>
+            <ac:spMk id="3" creationId="{D7AE6683-AEEF-921F-EA2D-6BBA91346062}"/>
+          </ac:spMkLst>
+        </pc:spChg>
+      </pc:sldChg>
+      <pc:sldChg chg="modSp new mod">
+        <pc:chgData name="Emily Crose" userId="5a1598ef78992c55" providerId="LiveId" clId="{75F37481-841B-40AD-A891-4A29A46DEAFB}" dt="2023-04-17T17:14:07.886" v="956" actId="20577"/>
+        <pc:sldMkLst>
+          <pc:docMk/>
+          <pc:sldMk cId="1806608824" sldId="300"/>
+        </pc:sldMkLst>
+        <pc:spChg chg="mod">
+          <ac:chgData name="Emily Crose" userId="5a1598ef78992c55" providerId="LiveId" clId="{75F37481-841B-40AD-A891-4A29A46DEAFB}" dt="2023-04-17T17:14:07.886" v="956" actId="20577"/>
+          <ac:spMkLst>
+            <pc:docMk/>
+            <pc:sldMk cId="1806608824" sldId="300"/>
+            <ac:spMk id="2" creationId="{8D38055C-DB38-EB4B-6669-F605D6529E50}"/>
+          </ac:spMkLst>
+        </pc:spChg>
+        <pc:spChg chg="mod">
+          <ac:chgData name="Emily Crose" userId="5a1598ef78992c55" providerId="LiveId" clId="{75F37481-841B-40AD-A891-4A29A46DEAFB}" dt="2023-04-17T14:17:54.714" v="478" actId="20577"/>
+          <ac:spMkLst>
+            <pc:docMk/>
+            <pc:sldMk cId="1806608824" sldId="300"/>
+            <ac:spMk id="3" creationId="{C8B57EC0-36E5-FD32-3113-980C3CF7B0A7}"/>
+          </ac:spMkLst>
+        </pc:spChg>
+      </pc:sldChg>
+      <pc:sldChg chg="addSp delSp modSp new mod setBg">
+        <pc:chgData name="Emily Crose" userId="5a1598ef78992c55" providerId="LiveId" clId="{75F37481-841B-40AD-A891-4A29A46DEAFB}" dt="2023-04-17T17:15:15.840" v="1002"/>
+        <pc:sldMkLst>
+          <pc:docMk/>
+          <pc:sldMk cId="543577936" sldId="301"/>
+        </pc:sldMkLst>
+        <pc:spChg chg="mod">
+          <ac:chgData name="Emily Crose" userId="5a1598ef78992c55" providerId="LiveId" clId="{75F37481-841B-40AD-A891-4A29A46DEAFB}" dt="2023-04-17T17:15:00.041" v="999" actId="20577"/>
+          <ac:spMkLst>
+            <pc:docMk/>
+            <pc:sldMk cId="543577936" sldId="301"/>
+            <ac:spMk id="2" creationId="{9F9904BA-EB83-D80E-3C87-76326E256305}"/>
+          </ac:spMkLst>
+        </pc:spChg>
+        <pc:spChg chg="add del mod">
+          <ac:chgData name="Emily Crose" userId="5a1598ef78992c55" providerId="LiveId" clId="{75F37481-841B-40AD-A891-4A29A46DEAFB}" dt="2023-04-17T17:15:15.840" v="1002"/>
+          <ac:spMkLst>
+            <pc:docMk/>
+            <pc:sldMk cId="543577936" sldId="301"/>
+            <ac:spMk id="3" creationId="{9C8D87AB-82A6-389E-B548-03168208847E}"/>
+          </ac:spMkLst>
+        </pc:spChg>
+        <pc:spChg chg="add del mod">
+          <ac:chgData name="Emily Crose" userId="5a1598ef78992c55" providerId="LiveId" clId="{75F37481-841B-40AD-A891-4A29A46DEAFB}" dt="2023-04-17T14:22:18.816" v="508"/>
+          <ac:spMkLst>
+            <pc:docMk/>
+            <pc:sldMk cId="543577936" sldId="301"/>
+            <ac:spMk id="4" creationId="{02E56284-0C94-6F6B-69F0-8FC8A8364A56}"/>
+          </ac:spMkLst>
+        </pc:spChg>
+        <pc:spChg chg="add del mod">
+          <ac:chgData name="Emily Crose" userId="5a1598ef78992c55" providerId="LiveId" clId="{75F37481-841B-40AD-A891-4A29A46DEAFB}" dt="2023-04-17T17:15:07.192" v="1001"/>
+          <ac:spMkLst>
+            <pc:docMk/>
+            <pc:sldMk cId="543577936" sldId="301"/>
+            <ac:spMk id="5" creationId="{4FB1A239-A9BB-E124-5F91-BCE2F956040A}"/>
+          </ac:spMkLst>
+        </pc:spChg>
+      </pc:sldChg>
+      <pc:sldChg chg="addSp delSp modSp new mod setBg modClrScheme chgLayout modNotesTx">
+        <pc:chgData name="Emily Crose" userId="5a1598ef78992c55" providerId="LiveId" clId="{75F37481-841B-40AD-A891-4A29A46DEAFB}" dt="2023-04-17T14:42:26.543" v="713" actId="20577"/>
+        <pc:sldMkLst>
+          <pc:docMk/>
+          <pc:sldMk cId="2572114698" sldId="302"/>
+        </pc:sldMkLst>
+        <pc:spChg chg="add mod ord">
+          <ac:chgData name="Emily Crose" userId="5a1598ef78992c55" providerId="LiveId" clId="{75F37481-841B-40AD-A891-4A29A46DEAFB}" dt="2023-04-17T14:42:04.429" v="587" actId="26606"/>
+          <ac:spMkLst>
+            <pc:docMk/>
+            <pc:sldMk cId="2572114698" sldId="302"/>
+            <ac:spMk id="2" creationId="{92EAB30D-4E16-2D45-A6BF-9FF8002DAD8A}"/>
+          </ac:spMkLst>
+        </pc:spChg>
+        <pc:spChg chg="add del mod">
+          <ac:chgData name="Emily Crose" userId="5a1598ef78992c55" providerId="LiveId" clId="{75F37481-841B-40AD-A891-4A29A46DEAFB}" dt="2023-04-17T14:41:55.438" v="583"/>
+          <ac:spMkLst>
+            <pc:docMk/>
+            <pc:sldMk cId="2572114698" sldId="302"/>
+            <ac:spMk id="3" creationId="{16A70CF7-F9B7-BC9A-A983-E1C1B38EEE3F}"/>
+          </ac:spMkLst>
+        </pc:spChg>
+        <pc:picChg chg="add mod ord">
+          <ac:chgData name="Emily Crose" userId="5a1598ef78992c55" providerId="LiveId" clId="{75F37481-841B-40AD-A891-4A29A46DEAFB}" dt="2023-04-17T14:42:04.429" v="587" actId="26606"/>
+          <ac:picMkLst>
+            <pc:docMk/>
+            <pc:sldMk cId="2572114698" sldId="302"/>
+            <ac:picMk id="5" creationId="{CD411802-6C10-63B2-4CCC-4C31FCB7B6BA}"/>
+          </ac:picMkLst>
+        </pc:picChg>
+      </pc:sldChg>
+      <pc:sldChg chg="addSp delSp modSp new mod setBg modClrScheme chgLayout">
+        <pc:chgData name="Emily Crose" userId="5a1598ef78992c55" providerId="LiveId" clId="{75F37481-841B-40AD-A891-4A29A46DEAFB}" dt="2023-04-17T17:13:52.170" v="951" actId="26606"/>
+        <pc:sldMkLst>
+          <pc:docMk/>
+          <pc:sldMk cId="4071440447" sldId="303"/>
+        </pc:sldMkLst>
+        <pc:spChg chg="mod ord">
+          <ac:chgData name="Emily Crose" userId="5a1598ef78992c55" providerId="LiveId" clId="{75F37481-841B-40AD-A891-4A29A46DEAFB}" dt="2023-04-17T17:13:52.170" v="951" actId="26606"/>
+          <ac:spMkLst>
+            <pc:docMk/>
+            <pc:sldMk cId="4071440447" sldId="303"/>
+            <ac:spMk id="2" creationId="{F0D38242-DC86-3A6E-B3B7-D1C3C0AFE94F}"/>
+          </ac:spMkLst>
+        </pc:spChg>
+        <pc:spChg chg="add mod ord">
+          <ac:chgData name="Emily Crose" userId="5a1598ef78992c55" providerId="LiveId" clId="{75F37481-841B-40AD-A891-4A29A46DEAFB}" dt="2023-04-17T17:13:52.170" v="951" actId="26606"/>
+          <ac:spMkLst>
+            <pc:docMk/>
+            <pc:sldMk cId="4071440447" sldId="303"/>
+            <ac:spMk id="3" creationId="{8FE505C2-50F6-30DB-CFB3-01D0D325516F}"/>
+          </ac:spMkLst>
+        </pc:spChg>
+        <pc:spChg chg="add">
+          <ac:chgData name="Emily Crose" userId="5a1598ef78992c55" providerId="LiveId" clId="{75F37481-841B-40AD-A891-4A29A46DEAFB}" dt="2023-04-17T17:13:52.170" v="951" actId="26606"/>
+          <ac:spMkLst>
+            <pc:docMk/>
+            <pc:sldMk cId="4071440447" sldId="303"/>
+            <ac:spMk id="14" creationId="{37D54B6C-87D0-4C03-8335-3955179D2B5B}"/>
+          </ac:spMkLst>
+        </pc:spChg>
+        <pc:picChg chg="add mod">
+          <ac:chgData name="Emily Crose" userId="5a1598ef78992c55" providerId="LiveId" clId="{75F37481-841B-40AD-A891-4A29A46DEAFB}" dt="2023-04-17T17:13:52.170" v="951" actId="26606"/>
+          <ac:picMkLst>
+            <pc:docMk/>
+            <pc:sldMk cId="4071440447" sldId="303"/>
+            <ac:picMk id="5" creationId="{E65D158D-924C-42EB-BD0B-55270F126CEB}"/>
+          </ac:picMkLst>
+        </pc:picChg>
+        <pc:picChg chg="add del">
+          <ac:chgData name="Emily Crose" userId="5a1598ef78992c55" providerId="LiveId" clId="{75F37481-841B-40AD-A891-4A29A46DEAFB}" dt="2023-04-17T17:13:52.170" v="951" actId="26606"/>
+          <ac:picMkLst>
+            <pc:docMk/>
+            <pc:sldMk cId="4071440447" sldId="303"/>
+            <ac:picMk id="9" creationId="{559DF61F-9058-49C9-8F75-DC501F983B0E}"/>
+          </ac:picMkLst>
+        </pc:picChg>
+      </pc:sldChg>
+      <pc:sldChg chg="addSp delSp modSp new mod setBg modClrScheme chgLayout modNotesTx">
+        <pc:chgData name="Emily Crose" userId="5a1598ef78992c55" providerId="LiveId" clId="{75F37481-841B-40AD-A891-4A29A46DEAFB}" dt="2023-04-17T17:17:00.332" v="1085" actId="20577"/>
+        <pc:sldMkLst>
+          <pc:docMk/>
+          <pc:sldMk cId="272553218" sldId="304"/>
+        </pc:sldMkLst>
+        <pc:spChg chg="del">
+          <ac:chgData name="Emily Crose" userId="5a1598ef78992c55" providerId="LiveId" clId="{75F37481-841B-40AD-A891-4A29A46DEAFB}" dt="2023-04-17T17:15:46.743" v="1004" actId="700"/>
+          <ac:spMkLst>
+            <pc:docMk/>
+            <pc:sldMk cId="272553218" sldId="304"/>
+            <ac:spMk id="2" creationId="{C7EE228C-0A7E-80F1-80C7-A6DF155A41BB}"/>
+          </ac:spMkLst>
+        </pc:spChg>
+        <pc:spChg chg="del">
+          <ac:chgData name="Emily Crose" userId="5a1598ef78992c55" providerId="LiveId" clId="{75F37481-841B-40AD-A891-4A29A46DEAFB}" dt="2023-04-17T17:15:46.743" v="1004" actId="700"/>
+          <ac:spMkLst>
+            <pc:docMk/>
+            <pc:sldMk cId="272553218" sldId="304"/>
+            <ac:spMk id="3" creationId="{F634F234-8296-ECB9-CDD6-8D5D8465FE96}"/>
+          </ac:spMkLst>
+        </pc:spChg>
+        <pc:spChg chg="add">
+          <ac:chgData name="Emily Crose" userId="5a1598ef78992c55" providerId="LiveId" clId="{75F37481-841B-40AD-A891-4A29A46DEAFB}" dt="2023-04-17T17:16:10.372" v="1008" actId="26606"/>
+          <ac:spMkLst>
+            <pc:docMk/>
+            <pc:sldMk cId="272553218" sldId="304"/>
+            <ac:spMk id="10" creationId="{D64A12F0-8158-4372-9761-AD0A6ED30C2E}"/>
+          </ac:spMkLst>
+        </pc:spChg>
+        <pc:picChg chg="add mod">
+          <ac:chgData name="Emily Crose" userId="5a1598ef78992c55" providerId="LiveId" clId="{75F37481-841B-40AD-A891-4A29A46DEAFB}" dt="2023-04-17T17:16:10.372" v="1008" actId="26606"/>
+          <ac:picMkLst>
+            <pc:docMk/>
+            <pc:sldMk cId="272553218" sldId="304"/>
+            <ac:picMk id="5" creationId="{C9F2630B-6A70-6167-F37D-97831177EA64}"/>
+          </ac:picMkLst>
+        </pc:picChg>
+      </pc:sldChg>
+      <pc:sldChg chg="addSp delSp modSp new mod setBg modClrScheme chgLayout">
+        <pc:chgData name="Emily Crose" userId="5a1598ef78992c55" providerId="LiveId" clId="{75F37481-841B-40AD-A891-4A29A46DEAFB}" dt="2023-04-17T17:21:17.171" v="1138" actId="6549"/>
+        <pc:sldMkLst>
+          <pc:docMk/>
+          <pc:sldMk cId="3697047610" sldId="305"/>
+        </pc:sldMkLst>
+        <pc:spChg chg="mod ord">
+          <ac:chgData name="Emily Crose" userId="5a1598ef78992c55" providerId="LiveId" clId="{75F37481-841B-40AD-A891-4A29A46DEAFB}" dt="2023-04-17T17:21:17.171" v="1138" actId="6549"/>
+          <ac:spMkLst>
+            <pc:docMk/>
+            <pc:sldMk cId="3697047610" sldId="305"/>
+            <ac:spMk id="2" creationId="{0F8A9B09-5002-4072-2245-008EFB3DBEA4}"/>
+          </ac:spMkLst>
+        </pc:spChg>
+        <pc:spChg chg="del">
+          <ac:chgData name="Emily Crose" userId="5a1598ef78992c55" providerId="LiveId" clId="{75F37481-841B-40AD-A891-4A29A46DEAFB}" dt="2023-04-17T17:18:27.097" v="1129"/>
+          <ac:spMkLst>
+            <pc:docMk/>
+            <pc:sldMk cId="3697047610" sldId="305"/>
+            <ac:spMk id="3" creationId="{EDF0E551-EC6C-2450-28D8-45BA4A718B52}"/>
+          </ac:spMkLst>
+        </pc:spChg>
+        <pc:picChg chg="add mod ord">
+          <ac:chgData name="Emily Crose" userId="5a1598ef78992c55" providerId="LiveId" clId="{75F37481-841B-40AD-A891-4A29A46DEAFB}" dt="2023-04-17T17:18:35.215" v="1133" actId="26606"/>
+          <ac:picMkLst>
+            <pc:docMk/>
+            <pc:sldMk cId="3697047610" sldId="305"/>
+            <ac:picMk id="5" creationId="{84671443-2680-DA6E-F177-D84F2B66BF71}"/>
+          </ac:picMkLst>
+        </pc:picChg>
+      </pc:sldChg>
+      <pc:sldChg chg="addSp modSp new mod setBg">
+        <pc:chgData name="Emily Crose" userId="5a1598ef78992c55" providerId="LiveId" clId="{75F37481-841B-40AD-A891-4A29A46DEAFB}" dt="2023-04-17T17:21:33.800" v="1159" actId="26606"/>
+        <pc:sldMkLst>
+          <pc:docMk/>
+          <pc:sldMk cId="1442831529" sldId="306"/>
+        </pc:sldMkLst>
+        <pc:spChg chg="mod">
+          <ac:chgData name="Emily Crose" userId="5a1598ef78992c55" providerId="LiveId" clId="{75F37481-841B-40AD-A891-4A29A46DEAFB}" dt="2023-04-17T17:21:33.800" v="1159" actId="26606"/>
+          <ac:spMkLst>
+            <pc:docMk/>
+            <pc:sldMk cId="1442831529" sldId="306"/>
+            <ac:spMk id="2" creationId="{14550114-62A8-59B5-B6B1-EBE576F3AB08}"/>
+          </ac:spMkLst>
+        </pc:spChg>
+        <pc:spChg chg="add">
+          <ac:chgData name="Emily Crose" userId="5a1598ef78992c55" providerId="LiveId" clId="{75F37481-841B-40AD-A891-4A29A46DEAFB}" dt="2023-04-17T17:21:33.800" v="1159" actId="26606"/>
+          <ac:spMkLst>
+            <pc:docMk/>
+            <pc:sldMk cId="1442831529" sldId="306"/>
+            <ac:spMk id="9" creationId="{93A46EEB-10AB-4E52-AF22-A848AE9259F9}"/>
+          </ac:spMkLst>
+        </pc:spChg>
+        <pc:picChg chg="add mod">
+          <ac:chgData name="Emily Crose" userId="5a1598ef78992c55" providerId="LiveId" clId="{75F37481-841B-40AD-A891-4A29A46DEAFB}" dt="2023-04-17T17:21:33.800" v="1159" actId="26606"/>
+          <ac:picMkLst>
+            <pc:docMk/>
+            <pc:sldMk cId="1442831529" sldId="306"/>
+            <ac:picMk id="4" creationId="{CE7776E4-5CA9-56DD-7084-87A6DFE122AE}"/>
+          </ac:picMkLst>
+        </pc:picChg>
+      </pc:sldChg>
+      <pc:sldChg chg="addSp modSp new mod setBg modClrScheme chgLayout">
+        <pc:chgData name="Emily Crose" userId="5a1598ef78992c55" providerId="LiveId" clId="{75F37481-841B-40AD-A891-4A29A46DEAFB}" dt="2023-04-17T17:22:43.602" v="1177" actId="26606"/>
+        <pc:sldMkLst>
+          <pc:docMk/>
+          <pc:sldMk cId="1996113951" sldId="307"/>
+        </pc:sldMkLst>
+        <pc:spChg chg="add mod">
+          <ac:chgData name="Emily Crose" userId="5a1598ef78992c55" providerId="LiveId" clId="{75F37481-841B-40AD-A891-4A29A46DEAFB}" dt="2023-04-17T17:22:43.602" v="1177" actId="26606"/>
+          <ac:spMkLst>
+            <pc:docMk/>
+            <pc:sldMk cId="1996113951" sldId="307"/>
+            <ac:spMk id="2" creationId="{9699BB10-D953-4E3C-098C-14C06B316910}"/>
+          </ac:spMkLst>
+        </pc:spChg>
+        <pc:spChg chg="add mod">
+          <ac:chgData name="Emily Crose" userId="5a1598ef78992c55" providerId="LiveId" clId="{75F37481-841B-40AD-A891-4A29A46DEAFB}" dt="2023-04-17T17:22:43.602" v="1177" actId="26606"/>
+          <ac:spMkLst>
+            <pc:docMk/>
+            <pc:sldMk cId="1996113951" sldId="307"/>
+            <ac:spMk id="3" creationId="{D80EA98A-E511-4EFE-C174-52517710B712}"/>
+          </ac:spMkLst>
+        </pc:spChg>
+        <pc:picChg chg="add">
+          <ac:chgData name="Emily Crose" userId="5a1598ef78992c55" providerId="LiveId" clId="{75F37481-841B-40AD-A891-4A29A46DEAFB}" dt="2023-04-17T17:22:43.602" v="1177" actId="26606"/>
+          <ac:picMkLst>
+            <pc:docMk/>
+            <pc:sldMk cId="1996113951" sldId="307"/>
+            <ac:picMk id="5" creationId="{D70D4FBC-E1A0-E8C6-7725-0B7F3F68E766}"/>
+          </ac:picMkLst>
+        </pc:picChg>
+        <pc:picChg chg="add">
+          <ac:chgData name="Emily Crose" userId="5a1598ef78992c55" providerId="LiveId" clId="{75F37481-841B-40AD-A891-4A29A46DEAFB}" dt="2023-04-17T17:22:43.602" v="1177" actId="26606"/>
+          <ac:picMkLst>
+            <pc:docMk/>
+            <pc:sldMk cId="1996113951" sldId="307"/>
+            <ac:picMk id="9" creationId="{2BFB581C-2142-4222-9A3B-905AD6C09535}"/>
+          </ac:picMkLst>
+        </pc:picChg>
       </pc:sldChg>
     </pc:docChg>
   </pc:docChgLst>
@@ -4083,7 +4555,7 @@
           <a:p>
             <a:fld id="{BE048F1E-0B01-B04D-9371-15538F615E4A}" type="datetimeFigureOut">
               <a:rPr lang="en-US" smtClean="0"/>
-              <a:t>4/16/2023</a:t>
+              <a:t>4/17/2023</a:t>
             </a:fld>
             <a:endParaRPr lang="en-US"/>
           </a:p>
@@ -4480,7 +4952,7 @@
           <a:p>
             <a:r>
               <a:rPr lang="en-US" dirty="0"/>
-              <a:t>Over the last couple of days, we’ve talked a lot about the types of software we may interact with in our lives. We now have a sense of scale of how large of a project it is to build an app, so the question for us becomes; how do we approach this project with as much organization as possible? That’s where the software development life cycle comes into play</a:t>
+              <a:t>API keys are meant to be kept secret. Why? Because they include information related to one specific account.</a:t>
             </a:r>
           </a:p>
         </p:txBody>
@@ -4502,7 +4974,7 @@
           <a:p>
             <a:fld id="{10D988CA-5978-2244-BA11-DC1A92DB7F45}" type="slidenum">
               <a:rPr lang="en-US" smtClean="0"/>
-              <a:t>8</a:t>
+              <a:t>7</a:t>
             </a:fld>
             <a:endParaRPr lang="en-US"/>
           </a:p>
@@ -4511,7 +4983,7 @@
     </p:spTree>
     <p:extLst>
       <p:ext uri="{BB962C8B-B14F-4D97-AF65-F5344CB8AC3E}">
-        <p14:creationId xmlns:p14="http://schemas.microsoft.com/office/powerpoint/2010/main" val="2000501755"/>
+        <p14:creationId xmlns:p14="http://schemas.microsoft.com/office/powerpoint/2010/main" val="642083912"/>
       </p:ext>
     </p:extLst>
   </p:cSld>
@@ -4567,7 +5039,7 @@
           <a:p>
             <a:r>
               <a:rPr lang="en-US" dirty="0"/>
-              <a:t>This is a simple example of the SDLC. Typically, representations of the SDLC will have around 6 steps, but the steps will generally match what you see here. </a:t>
+              <a:t>So let’s take a look at what an API actually looks like in practice.</a:t>
             </a:r>
           </a:p>
         </p:txBody>
@@ -4589,7 +5061,7 @@
           <a:p>
             <a:fld id="{10D988CA-5978-2244-BA11-DC1A92DB7F45}" type="slidenum">
               <a:rPr lang="en-US" smtClean="0"/>
-              <a:t>10</a:t>
+              <a:t>14</a:t>
             </a:fld>
             <a:endParaRPr lang="en-US"/>
           </a:p>
@@ -4598,7 +5070,7 @@
     </p:spTree>
     <p:extLst>
       <p:ext uri="{BB962C8B-B14F-4D97-AF65-F5344CB8AC3E}">
-        <p14:creationId xmlns:p14="http://schemas.microsoft.com/office/powerpoint/2010/main" val="2071879139"/>
+        <p14:creationId xmlns:p14="http://schemas.microsoft.com/office/powerpoint/2010/main" val="499617542"/>
       </p:ext>
     </p:extLst>
   </p:cSld>
@@ -4673,7 +5145,265 @@
           <a:p>
             <a:fld id="{10D988CA-5978-2244-BA11-DC1A92DB7F45}" type="slidenum">
               <a:rPr lang="en-US" smtClean="0"/>
-              <a:t>12</a:t>
+              <a:t>16</a:t>
+            </a:fld>
+            <a:endParaRPr lang="en-US"/>
+          </a:p>
+        </p:txBody>
+      </p:sp>
+    </p:spTree>
+    <p:extLst>
+      <p:ext uri="{BB962C8B-B14F-4D97-AF65-F5344CB8AC3E}">
+        <p14:creationId xmlns:p14="http://schemas.microsoft.com/office/powerpoint/2010/main" val="2535370424"/>
+      </p:ext>
+    </p:extLst>
+  </p:cSld>
+  <p:clrMapOvr>
+    <a:masterClrMapping/>
+  </p:clrMapOvr>
+</p:notes>
+</file>
+
+<file path=ppt/notesSlides/notesSlide5.xml><?xml version="1.0" encoding="utf-8"?>
+<p:notes xmlns:a="http://schemas.openxmlformats.org/drawingml/2006/main" xmlns:r="http://schemas.openxmlformats.org/officeDocument/2006/relationships" xmlns:p="http://schemas.openxmlformats.org/presentationml/2006/main">
+  <p:cSld>
+    <p:spTree>
+      <p:nvGrpSpPr>
+        <p:cNvPr id="1" name=""/>
+        <p:cNvGrpSpPr/>
+        <p:nvPr/>
+      </p:nvGrpSpPr>
+      <p:grpSpPr>
+        <a:xfrm>
+          <a:off x="0" y="0"/>
+          <a:ext cx="0" cy="0"/>
+          <a:chOff x="0" y="0"/>
+          <a:chExt cx="0" cy="0"/>
+        </a:xfrm>
+      </p:grpSpPr>
+      <p:sp>
+        <p:nvSpPr>
+          <p:cNvPr id="2" name="Slide Image Placeholder 1"/>
+          <p:cNvSpPr>
+            <a:spLocks noGrp="1" noRot="1" noChangeAspect="1"/>
+          </p:cNvSpPr>
+          <p:nvPr>
+            <p:ph type="sldImg"/>
+          </p:nvPr>
+        </p:nvSpPr>
+        <p:spPr/>
+      </p:sp>
+      <p:sp>
+        <p:nvSpPr>
+          <p:cNvPr id="3" name="Notes Placeholder 2"/>
+          <p:cNvSpPr>
+            <a:spLocks noGrp="1"/>
+          </p:cNvSpPr>
+          <p:nvPr>
+            <p:ph type="body" idx="1"/>
+          </p:nvPr>
+        </p:nvSpPr>
+        <p:spPr/>
+        <p:txBody>
+          <a:bodyPr/>
+          <a:lstStyle/>
+          <a:p>
+            <a:r>
+              <a:rPr lang="en-US" dirty="0"/>
+              <a:t>Over the last couple of days, we’ve talked a lot about the types of software we may interact with in our lives. We now have a sense of scale of how large of a project it is to build an app, so the question for us becomes; how do we approach this project with as much organization as possible? That’s where the software development life cycle comes into play</a:t>
+            </a:r>
+          </a:p>
+        </p:txBody>
+      </p:sp>
+      <p:sp>
+        <p:nvSpPr>
+          <p:cNvPr id="4" name="Slide Number Placeholder 3"/>
+          <p:cNvSpPr>
+            <a:spLocks noGrp="1"/>
+          </p:cNvSpPr>
+          <p:nvPr>
+            <p:ph type="sldNum" sz="quarter" idx="5"/>
+          </p:nvPr>
+        </p:nvSpPr>
+        <p:spPr/>
+        <p:txBody>
+          <a:bodyPr/>
+          <a:lstStyle/>
+          <a:p>
+            <a:fld id="{10D988CA-5978-2244-BA11-DC1A92DB7F45}" type="slidenum">
+              <a:rPr lang="en-US" smtClean="0"/>
+              <a:t>18</a:t>
+            </a:fld>
+            <a:endParaRPr lang="en-US"/>
+          </a:p>
+        </p:txBody>
+      </p:sp>
+    </p:spTree>
+    <p:extLst>
+      <p:ext uri="{BB962C8B-B14F-4D97-AF65-F5344CB8AC3E}">
+        <p14:creationId xmlns:p14="http://schemas.microsoft.com/office/powerpoint/2010/main" val="2000501755"/>
+      </p:ext>
+    </p:extLst>
+  </p:cSld>
+  <p:clrMapOvr>
+    <a:masterClrMapping/>
+  </p:clrMapOvr>
+</p:notes>
+</file>
+
+<file path=ppt/notesSlides/notesSlide6.xml><?xml version="1.0" encoding="utf-8"?>
+<p:notes xmlns:a="http://schemas.openxmlformats.org/drawingml/2006/main" xmlns:r="http://schemas.openxmlformats.org/officeDocument/2006/relationships" xmlns:p="http://schemas.openxmlformats.org/presentationml/2006/main">
+  <p:cSld>
+    <p:spTree>
+      <p:nvGrpSpPr>
+        <p:cNvPr id="1" name=""/>
+        <p:cNvGrpSpPr/>
+        <p:nvPr/>
+      </p:nvGrpSpPr>
+      <p:grpSpPr>
+        <a:xfrm>
+          <a:off x="0" y="0"/>
+          <a:ext cx="0" cy="0"/>
+          <a:chOff x="0" y="0"/>
+          <a:chExt cx="0" cy="0"/>
+        </a:xfrm>
+      </p:grpSpPr>
+      <p:sp>
+        <p:nvSpPr>
+          <p:cNvPr id="2" name="Slide Image Placeholder 1"/>
+          <p:cNvSpPr>
+            <a:spLocks noGrp="1" noRot="1" noChangeAspect="1"/>
+          </p:cNvSpPr>
+          <p:nvPr>
+            <p:ph type="sldImg"/>
+          </p:nvPr>
+        </p:nvSpPr>
+        <p:spPr/>
+      </p:sp>
+      <p:sp>
+        <p:nvSpPr>
+          <p:cNvPr id="3" name="Notes Placeholder 2"/>
+          <p:cNvSpPr>
+            <a:spLocks noGrp="1"/>
+          </p:cNvSpPr>
+          <p:nvPr>
+            <p:ph type="body" idx="1"/>
+          </p:nvPr>
+        </p:nvSpPr>
+        <p:spPr/>
+        <p:txBody>
+          <a:bodyPr/>
+          <a:lstStyle/>
+          <a:p>
+            <a:r>
+              <a:rPr lang="en-US" dirty="0"/>
+              <a:t>This is a simple example of the SDLC. Typically, representations of the SDLC will have around 6 steps, but the steps will generally match what you see here. </a:t>
+            </a:r>
+          </a:p>
+        </p:txBody>
+      </p:sp>
+      <p:sp>
+        <p:nvSpPr>
+          <p:cNvPr id="4" name="Slide Number Placeholder 3"/>
+          <p:cNvSpPr>
+            <a:spLocks noGrp="1"/>
+          </p:cNvSpPr>
+          <p:nvPr>
+            <p:ph type="sldNum" sz="quarter" idx="5"/>
+          </p:nvPr>
+        </p:nvSpPr>
+        <p:spPr/>
+        <p:txBody>
+          <a:bodyPr/>
+          <a:lstStyle/>
+          <a:p>
+            <a:fld id="{10D988CA-5978-2244-BA11-DC1A92DB7F45}" type="slidenum">
+              <a:rPr lang="en-US" smtClean="0"/>
+              <a:t>20</a:t>
+            </a:fld>
+            <a:endParaRPr lang="en-US"/>
+          </a:p>
+        </p:txBody>
+      </p:sp>
+    </p:spTree>
+    <p:extLst>
+      <p:ext uri="{BB962C8B-B14F-4D97-AF65-F5344CB8AC3E}">
+        <p14:creationId xmlns:p14="http://schemas.microsoft.com/office/powerpoint/2010/main" val="2071879139"/>
+      </p:ext>
+    </p:extLst>
+  </p:cSld>
+  <p:clrMapOvr>
+    <a:masterClrMapping/>
+  </p:clrMapOvr>
+</p:notes>
+</file>
+
+<file path=ppt/notesSlides/notesSlide7.xml><?xml version="1.0" encoding="utf-8"?>
+<p:notes xmlns:a="http://schemas.openxmlformats.org/drawingml/2006/main" xmlns:r="http://schemas.openxmlformats.org/officeDocument/2006/relationships" xmlns:p="http://schemas.openxmlformats.org/presentationml/2006/main">
+  <p:cSld>
+    <p:spTree>
+      <p:nvGrpSpPr>
+        <p:cNvPr id="1" name=""/>
+        <p:cNvGrpSpPr/>
+        <p:nvPr/>
+      </p:nvGrpSpPr>
+      <p:grpSpPr>
+        <a:xfrm>
+          <a:off x="0" y="0"/>
+          <a:ext cx="0" cy="0"/>
+          <a:chOff x="0" y="0"/>
+          <a:chExt cx="0" cy="0"/>
+        </a:xfrm>
+      </p:grpSpPr>
+      <p:sp>
+        <p:nvSpPr>
+          <p:cNvPr id="2" name="Slide Image Placeholder 1"/>
+          <p:cNvSpPr>
+            <a:spLocks noGrp="1" noRot="1" noChangeAspect="1"/>
+          </p:cNvSpPr>
+          <p:nvPr>
+            <p:ph type="sldImg"/>
+          </p:nvPr>
+        </p:nvSpPr>
+        <p:spPr/>
+      </p:sp>
+      <p:sp>
+        <p:nvSpPr>
+          <p:cNvPr id="3" name="Notes Placeholder 2"/>
+          <p:cNvSpPr>
+            <a:spLocks noGrp="1"/>
+          </p:cNvSpPr>
+          <p:nvPr>
+            <p:ph type="body" idx="1"/>
+          </p:nvPr>
+        </p:nvSpPr>
+        <p:spPr/>
+        <p:txBody>
+          <a:bodyPr/>
+          <a:lstStyle/>
+          <a:p>
+            <a:endParaRPr lang="en-US" dirty="0"/>
+          </a:p>
+        </p:txBody>
+      </p:sp>
+      <p:sp>
+        <p:nvSpPr>
+          <p:cNvPr id="4" name="Slide Number Placeholder 3"/>
+          <p:cNvSpPr>
+            <a:spLocks noGrp="1"/>
+          </p:cNvSpPr>
+          <p:nvPr>
+            <p:ph type="sldNum" sz="quarter" idx="5"/>
+          </p:nvPr>
+        </p:nvSpPr>
+        <p:spPr/>
+        <p:txBody>
+          <a:bodyPr/>
+          <a:lstStyle/>
+          <a:p>
+            <a:fld id="{10D988CA-5978-2244-BA11-DC1A92DB7F45}" type="slidenum">
+              <a:rPr lang="en-US" smtClean="0"/>
+              <a:t>22</a:t>
             </a:fld>
             <a:endParaRPr lang="en-US"/>
           </a:p>
@@ -4877,7 +5607,7 @@
           <a:p>
             <a:fld id="{1160EA64-D806-43AC-9DF2-F8C432F32B4C}" type="datetimeFigureOut">
               <a:rPr lang="en-US" smtClean="0"/>
-              <a:t>4/16/2023</a:t>
+              <a:t>4/17/2023</a:t>
             </a:fld>
             <a:endParaRPr lang="en-US" dirty="0"/>
           </a:p>
@@ -5176,7 +5906,7 @@
           <a:p>
             <a:fld id="{1160EA64-D806-43AC-9DF2-F8C432F32B4C}" type="datetimeFigureOut">
               <a:rPr lang="en-US" smtClean="0"/>
-              <a:t>4/16/2023</a:t>
+              <a:t>4/17/2023</a:t>
             </a:fld>
             <a:endParaRPr lang="en-US" dirty="0"/>
           </a:p>
@@ -5370,7 +6100,7 @@
           <a:p>
             <a:fld id="{1160EA64-D806-43AC-9DF2-F8C432F32B4C}" type="datetimeFigureOut">
               <a:rPr lang="en-US" smtClean="0"/>
-              <a:t>4/16/2023</a:t>
+              <a:t>4/17/2023</a:t>
             </a:fld>
             <a:endParaRPr lang="en-US" dirty="0"/>
           </a:p>
@@ -5633,7 +6363,7 @@
           <a:p>
             <a:fld id="{1160EA64-D806-43AC-9DF2-F8C432F32B4C}" type="datetimeFigureOut">
               <a:rPr lang="en-US" smtClean="0"/>
-              <a:t>4/16/2023</a:t>
+              <a:t>4/17/2023</a:t>
             </a:fld>
             <a:endParaRPr lang="en-US" dirty="0"/>
           </a:p>
@@ -6059,7 +6789,7 @@
           <a:p>
             <a:fld id="{1160EA64-D806-43AC-9DF2-F8C432F32B4C}" type="datetimeFigureOut">
               <a:rPr lang="en-US" smtClean="0"/>
-              <a:t>4/16/2023</a:t>
+              <a:t>4/17/2023</a:t>
             </a:fld>
             <a:endParaRPr lang="en-US" dirty="0"/>
           </a:p>
@@ -6598,7 +7328,7 @@
           <a:p>
             <a:fld id="{1160EA64-D806-43AC-9DF2-F8C432F32B4C}" type="datetimeFigureOut">
               <a:rPr lang="en-US" smtClean="0"/>
-              <a:t>4/16/2023</a:t>
+              <a:t>4/17/2023</a:t>
             </a:fld>
             <a:endParaRPr lang="en-US" dirty="0"/>
           </a:p>
@@ -7464,7 +8194,7 @@
           <a:p>
             <a:fld id="{1160EA64-D806-43AC-9DF2-F8C432F32B4C}" type="datetimeFigureOut">
               <a:rPr lang="en-US" smtClean="0"/>
-              <a:t>4/16/2023</a:t>
+              <a:t>4/17/2023</a:t>
             </a:fld>
             <a:endParaRPr lang="en-US" dirty="0"/>
           </a:p>
@@ -7636,7 +8366,7 @@
           <a:p>
             <a:fld id="{E9F9C37B-1D36-470B-8223-D6C91242EC14}" type="datetimeFigureOut">
               <a:rPr lang="en-US" smtClean="0"/>
-              <a:t>4/16/2023</a:t>
+              <a:t>4/17/2023</a:t>
             </a:fld>
             <a:endParaRPr lang="en-US" dirty="0"/>
           </a:p>
@@ -7820,7 +8550,7 @@
           <a:p>
             <a:fld id="{67C6F52A-A82B-47A2-A83A-8C4C91F2D59F}" type="datetimeFigureOut">
               <a:rPr lang="en-US" smtClean="0"/>
-              <a:t>4/16/2023</a:t>
+              <a:t>4/17/2023</a:t>
             </a:fld>
             <a:endParaRPr lang="en-US" dirty="0"/>
           </a:p>
@@ -7990,7 +8720,7 @@
           <a:p>
             <a:fld id="{F070A7B3-6521-4DCA-87E5-044747A908C1}" type="datetimeFigureOut">
               <a:rPr lang="en-US" smtClean="0"/>
-              <a:t>4/16/2023</a:t>
+              <a:t>4/17/2023</a:t>
             </a:fld>
             <a:endParaRPr lang="en-US" dirty="0"/>
           </a:p>
@@ -8235,7 +8965,7 @@
           <a:p>
             <a:fld id="{1160EA64-D806-43AC-9DF2-F8C432F32B4C}" type="datetimeFigureOut">
               <a:rPr lang="en-US" smtClean="0"/>
-              <a:t>4/16/2023</a:t>
+              <a:t>4/17/2023</a:t>
             </a:fld>
             <a:endParaRPr lang="en-US" dirty="0"/>
           </a:p>
@@ -8472,7 +9202,7 @@
           <a:p>
             <a:fld id="{AB134690-1557-4C89-A502-4959FE7FAD70}" type="datetimeFigureOut">
               <a:rPr lang="en-US" smtClean="0"/>
-              <a:t>4/16/2023</a:t>
+              <a:t>4/17/2023</a:t>
             </a:fld>
             <a:endParaRPr lang="en-US" dirty="0"/>
           </a:p>
@@ -8938,7 +9668,7 @@
           <a:p>
             <a:fld id="{1160EA64-D806-43AC-9DF2-F8C432F32B4C}" type="datetimeFigureOut">
               <a:rPr lang="en-US" smtClean="0"/>
-              <a:t>4/16/2023</a:t>
+              <a:t>4/17/2023</a:t>
             </a:fld>
             <a:endParaRPr lang="en-US" dirty="0"/>
           </a:p>
@@ -9058,7 +9788,7 @@
           <a:p>
             <a:fld id="{E1037C31-9E7A-4F99-8774-A0E530DE1A42}" type="datetimeFigureOut">
               <a:rPr lang="en-US" smtClean="0"/>
-              <a:t>4/16/2023</a:t>
+              <a:t>4/17/2023</a:t>
             </a:fld>
             <a:endParaRPr lang="en-US" dirty="0"/>
           </a:p>
@@ -9153,7 +9883,7 @@
           <a:p>
             <a:fld id="{C278504F-A551-4DE0-9316-4DCD1D8CC752}" type="datetimeFigureOut">
               <a:rPr lang="en-US" smtClean="0"/>
-              <a:t>4/16/2023</a:t>
+              <a:t>4/17/2023</a:t>
             </a:fld>
             <a:endParaRPr lang="en-US" dirty="0"/>
           </a:p>
@@ -9408,7 +10138,7 @@
           <a:p>
             <a:fld id="{D1BE4249-C0D0-4B06-8692-E8BB871AF643}" type="datetimeFigureOut">
               <a:rPr lang="en-US" smtClean="0"/>
-              <a:t>4/16/2023</a:t>
+              <a:t>4/17/2023</a:t>
             </a:fld>
             <a:endParaRPr lang="en-US" dirty="0"/>
           </a:p>
@@ -9708,7 +10438,7 @@
           <a:p>
             <a:fld id="{042B0DB6-F5C7-45FB-8CF3-31B45F9C2DAC}" type="datetimeFigureOut">
               <a:rPr lang="en-US" smtClean="0"/>
-              <a:t>4/16/2023</a:t>
+              <a:t>4/17/2023</a:t>
             </a:fld>
             <a:endParaRPr lang="en-US" dirty="0"/>
           </a:p>
@@ -9942,7 +10672,7 @@
           <a:p>
             <a:fld id="{1160EA64-D806-43AC-9DF2-F8C432F32B4C}" type="datetimeFigureOut">
               <a:rPr lang="en-US" smtClean="0"/>
-              <a:t>4/16/2023</a:t>
+              <a:t>4/17/2023</a:t>
             </a:fld>
             <a:endParaRPr lang="en-US" dirty="0"/>
           </a:p>
@@ -10848,7 +11578,7 @@
           </a:effectLst>
           <a:extLst>
             <a:ext uri="{91240B29-F687-4f45-9708-019B960494DF}">
-              <a14:hiddenLine xmlns="" xmlns:a16="http://schemas.microsoft.com/office/drawing/2014/main" xmlns:p14="http://schemas.microsoft.com/office/powerpoint/2010/main" xmlns:a14="http://schemas.microsoft.com/office/drawing/2010/main" w="9525">
+              <a14:hiddenLine xmlns:a14="http://schemas.microsoft.com/office/drawing/2010/main" xmlns:p14="http://schemas.microsoft.com/office/powerpoint/2010/main" xmlns:a16="http://schemas.microsoft.com/office/drawing/2014/main" xmlns="" w="9525">
                 <a:solidFill>
                   <a:srgbClr val="000000"/>
                 </a:solidFill>
@@ -10998,6 +11728,1536 @@
 </file>
 
 <file path=ppt/slides/slide10.xml><?xml version="1.0" encoding="utf-8"?>
+<p:sld xmlns:a="http://schemas.openxmlformats.org/drawingml/2006/main" xmlns:r="http://schemas.openxmlformats.org/officeDocument/2006/relationships" xmlns:p="http://schemas.openxmlformats.org/presentationml/2006/main">
+  <p:cSld>
+    <p:spTree>
+      <p:nvGrpSpPr>
+        <p:cNvPr id="1" name=""/>
+        <p:cNvGrpSpPr/>
+        <p:nvPr/>
+      </p:nvGrpSpPr>
+      <p:grpSpPr>
+        <a:xfrm>
+          <a:off x="0" y="0"/>
+          <a:ext cx="0" cy="0"/>
+          <a:chOff x="0" y="0"/>
+          <a:chExt cx="0" cy="0"/>
+        </a:xfrm>
+      </p:grpSpPr>
+      <p:sp>
+        <p:nvSpPr>
+          <p:cNvPr id="2" name="Title 1">
+            <a:extLst>
+              <a:ext uri="{FF2B5EF4-FFF2-40B4-BE49-F238E27FC236}">
+                <a16:creationId xmlns:a16="http://schemas.microsoft.com/office/drawing/2014/main" id="{8D38055C-DB38-EB4B-6669-F605D6529E50}"/>
+              </a:ext>
+            </a:extLst>
+          </p:cNvPr>
+          <p:cNvSpPr>
+            <a:spLocks noGrp="1"/>
+          </p:cNvSpPr>
+          <p:nvPr>
+            <p:ph type="title"/>
+          </p:nvPr>
+        </p:nvSpPr>
+        <p:spPr/>
+        <p:txBody>
+          <a:bodyPr/>
+          <a:lstStyle/>
+          <a:p>
+            <a:r>
+              <a:rPr lang="en-US" dirty="0"/>
+              <a:t>HTTP API Verbs</a:t>
+            </a:r>
+          </a:p>
+        </p:txBody>
+      </p:sp>
+      <p:sp>
+        <p:nvSpPr>
+          <p:cNvPr id="3" name="Content Placeholder 2">
+            <a:extLst>
+              <a:ext uri="{FF2B5EF4-FFF2-40B4-BE49-F238E27FC236}">
+                <a16:creationId xmlns:a16="http://schemas.microsoft.com/office/drawing/2014/main" id="{C8B57EC0-36E5-FD32-3113-980C3CF7B0A7}"/>
+              </a:ext>
+            </a:extLst>
+          </p:cNvPr>
+          <p:cNvSpPr>
+            <a:spLocks noGrp="1"/>
+          </p:cNvSpPr>
+          <p:nvPr>
+            <p:ph idx="1"/>
+          </p:nvPr>
+        </p:nvSpPr>
+        <p:spPr/>
+        <p:txBody>
+          <a:bodyPr/>
+          <a:lstStyle/>
+          <a:p>
+            <a:r>
+              <a:rPr lang="en-US" dirty="0"/>
+              <a:t>HTTP</a:t>
+            </a:r>
+          </a:p>
+          <a:p>
+            <a:pPr lvl="1"/>
+            <a:r>
+              <a:rPr lang="en-US" dirty="0"/>
+              <a:t>GET</a:t>
+            </a:r>
+          </a:p>
+          <a:p>
+            <a:pPr lvl="1"/>
+            <a:r>
+              <a:rPr lang="en-US" dirty="0"/>
+              <a:t>POST</a:t>
+            </a:r>
+          </a:p>
+          <a:p>
+            <a:pPr lvl="1"/>
+            <a:r>
+              <a:rPr lang="en-US" dirty="0"/>
+              <a:t>PUT</a:t>
+            </a:r>
+          </a:p>
+          <a:p>
+            <a:pPr lvl="1"/>
+            <a:r>
+              <a:rPr lang="en-US" dirty="0"/>
+              <a:t>DELETE</a:t>
+            </a:r>
+          </a:p>
+        </p:txBody>
+      </p:sp>
+    </p:spTree>
+    <p:extLst>
+      <p:ext uri="{BB962C8B-B14F-4D97-AF65-F5344CB8AC3E}">
+        <p14:creationId xmlns:p14="http://schemas.microsoft.com/office/powerpoint/2010/main" val="1806608824"/>
+      </p:ext>
+    </p:extLst>
+  </p:cSld>
+  <p:clrMapOvr>
+    <a:masterClrMapping/>
+  </p:clrMapOvr>
+</p:sld>
+</file>
+
+<file path=ppt/slides/slide11.xml><?xml version="1.0" encoding="utf-8"?>
+<p:sld xmlns:a="http://schemas.openxmlformats.org/drawingml/2006/main" xmlns:r="http://schemas.openxmlformats.org/officeDocument/2006/relationships" xmlns:p="http://schemas.openxmlformats.org/presentationml/2006/main">
+  <p:cSld>
+    <p:bg>
+      <p:bgPr>
+        <a:blipFill rotWithShape="1">
+          <a:blip r:embed="rId2">
+            <a:duotone>
+              <a:schemeClr val="bg2">
+                <a:shade val="80000"/>
+                <a:lumMod val="80000"/>
+              </a:schemeClr>
+              <a:schemeClr val="bg2">
+                <a:tint val="98000"/>
+              </a:schemeClr>
+            </a:duotone>
+          </a:blip>
+          <a:stretch/>
+        </a:blipFill>
+        <a:effectLst/>
+      </p:bgPr>
+    </p:bg>
+    <p:spTree>
+      <p:nvGrpSpPr>
+        <p:cNvPr id="1" name=""/>
+        <p:cNvGrpSpPr/>
+        <p:nvPr/>
+      </p:nvGrpSpPr>
+      <p:grpSpPr>
+        <a:xfrm>
+          <a:off x="0" y="0"/>
+          <a:ext cx="0" cy="0"/>
+          <a:chOff x="0" y="0"/>
+          <a:chExt cx="0" cy="0"/>
+        </a:xfrm>
+      </p:grpSpPr>
+      <p:sp>
+        <p:nvSpPr>
+          <p:cNvPr id="2" name="Title 1">
+            <a:extLst>
+              <a:ext uri="{FF2B5EF4-FFF2-40B4-BE49-F238E27FC236}">
+                <a16:creationId xmlns:a16="http://schemas.microsoft.com/office/drawing/2014/main" id="{0F8A9B09-5002-4072-2245-008EFB3DBEA4}"/>
+              </a:ext>
+            </a:extLst>
+          </p:cNvPr>
+          <p:cNvSpPr>
+            <a:spLocks noGrp="1"/>
+          </p:cNvSpPr>
+          <p:nvPr>
+            <p:ph type="title"/>
+          </p:nvPr>
+        </p:nvSpPr>
+        <p:spPr>
+          <a:xfrm>
+            <a:off x="1370693" y="4406537"/>
+            <a:ext cx="9440034" cy="1088336"/>
+          </a:xfrm>
+        </p:spPr>
+        <p:txBody>
+          <a:bodyPr vert="horz" lIns="91440" tIns="45720" rIns="91440" bIns="45720" rtlCol="0" anchor="b">
+            <a:normAutofit/>
+          </a:bodyPr>
+          <a:lstStyle/>
+          <a:p>
+            <a:r>
+              <a:rPr lang="en-US" sz="4800" dirty="0"/>
+              <a:t>HTTP GET Header</a:t>
+            </a:r>
+          </a:p>
+        </p:txBody>
+      </p:sp>
+      <p:pic>
+        <p:nvPicPr>
+          <p:cNvPr id="5" name="Content Placeholder 4" descr="Text&#10;&#10;Description automatically generated">
+            <a:extLst>
+              <a:ext uri="{FF2B5EF4-FFF2-40B4-BE49-F238E27FC236}">
+                <a16:creationId xmlns:a16="http://schemas.microsoft.com/office/drawing/2014/main" id="{84671443-2680-DA6E-F177-D84F2B66BF71}"/>
+              </a:ext>
+            </a:extLst>
+          </p:cNvPr>
+          <p:cNvPicPr>
+            <a:picLocks noGrp="1" noChangeAspect="1"/>
+          </p:cNvPicPr>
+          <p:nvPr>
+            <p:ph idx="4294967295"/>
+          </p:nvPr>
+        </p:nvPicPr>
+        <p:blipFill>
+          <a:blip r:embed="rId3"/>
+          <a:stretch>
+            <a:fillRect/>
+          </a:stretch>
+        </p:blipFill>
+        <p:spPr>
+          <a:xfrm>
+            <a:off x="2218349" y="643463"/>
+            <a:ext cx="7762090" cy="3249553"/>
+          </a:xfrm>
+          <a:prstGeom prst="rect">
+            <a:avLst/>
+          </a:prstGeom>
+        </p:spPr>
+      </p:pic>
+    </p:spTree>
+    <p:extLst>
+      <p:ext uri="{BB962C8B-B14F-4D97-AF65-F5344CB8AC3E}">
+        <p14:creationId xmlns:p14="http://schemas.microsoft.com/office/powerpoint/2010/main" val="3697047610"/>
+      </p:ext>
+    </p:extLst>
+  </p:cSld>
+  <p:clrMapOvr>
+    <a:masterClrMapping/>
+  </p:clrMapOvr>
+</p:sld>
+</file>
+
+<file path=ppt/slides/slide12.xml><?xml version="1.0" encoding="utf-8"?>
+<p:sld xmlns:a="http://schemas.openxmlformats.org/drawingml/2006/main" xmlns:r="http://schemas.openxmlformats.org/officeDocument/2006/relationships" xmlns:p="http://schemas.openxmlformats.org/presentationml/2006/main">
+  <p:cSld>
+    <p:bg>
+      <p:bgPr>
+        <a:blipFill rotWithShape="1">
+          <a:blip r:embed="rId2">
+            <a:duotone>
+              <a:schemeClr val="bg2">
+                <a:shade val="80000"/>
+                <a:lumMod val="80000"/>
+              </a:schemeClr>
+              <a:schemeClr val="bg2">
+                <a:tint val="98000"/>
+              </a:schemeClr>
+            </a:duotone>
+          </a:blip>
+          <a:stretch/>
+        </a:blipFill>
+        <a:effectLst/>
+      </p:bgPr>
+    </p:bg>
+    <p:spTree>
+      <p:nvGrpSpPr>
+        <p:cNvPr id="1" name=""/>
+        <p:cNvGrpSpPr/>
+        <p:nvPr/>
+      </p:nvGrpSpPr>
+      <p:grpSpPr>
+        <a:xfrm>
+          <a:off x="0" y="0"/>
+          <a:ext cx="0" cy="0"/>
+          <a:chOff x="0" y="0"/>
+          <a:chExt cx="0" cy="0"/>
+        </a:xfrm>
+      </p:grpSpPr>
+      <p:sp>
+        <p:nvSpPr>
+          <p:cNvPr id="2" name="Title 1">
+            <a:extLst>
+              <a:ext uri="{FF2B5EF4-FFF2-40B4-BE49-F238E27FC236}">
+                <a16:creationId xmlns:a16="http://schemas.microsoft.com/office/drawing/2014/main" id="{14550114-62A8-59B5-B6B1-EBE576F3AB08}"/>
+              </a:ext>
+            </a:extLst>
+          </p:cNvPr>
+          <p:cNvSpPr>
+            <a:spLocks noGrp="1"/>
+          </p:cNvSpPr>
+          <p:nvPr>
+            <p:ph type="title"/>
+          </p:nvPr>
+        </p:nvSpPr>
+        <p:spPr>
+          <a:xfrm>
+            <a:off x="8094617" y="965196"/>
+            <a:ext cx="3137262" cy="2633146"/>
+          </a:xfrm>
+        </p:spPr>
+        <p:txBody>
+          <a:bodyPr vert="horz" lIns="91440" tIns="45720" rIns="91440" bIns="45720" rtlCol="0" anchor="b">
+            <a:normAutofit/>
+          </a:bodyPr>
+          <a:lstStyle/>
+          <a:p>
+            <a:r>
+              <a:rPr lang="en-US" dirty="0"/>
+              <a:t>HTTP POST Header</a:t>
+            </a:r>
+          </a:p>
+        </p:txBody>
+      </p:sp>
+      <p:sp>
+        <p:nvSpPr>
+          <p:cNvPr id="9" name="Rectangle 8">
+            <a:extLst>
+              <a:ext uri="{FF2B5EF4-FFF2-40B4-BE49-F238E27FC236}">
+                <a16:creationId xmlns:a16="http://schemas.microsoft.com/office/drawing/2014/main" id="{93A46EEB-10AB-4E52-AF22-A848AE9259F9}"/>
+              </a:ext>
+              <a:ext uri="{C183D7F6-B498-43B3-948B-1728B52AA6E4}">
+                <adec:decorative xmlns:adec="http://schemas.microsoft.com/office/drawing/2017/decorative" val="1"/>
+              </a:ext>
+            </a:extLst>
+          </p:cNvPr>
+          <p:cNvSpPr>
+            <a:spLocks noGrp="1" noRot="1" noChangeAspect="1" noMove="1" noResize="1" noEditPoints="1" noAdjustHandles="1" noChangeArrowheads="1" noChangeShapeType="1" noTextEdit="1"/>
+          </p:cNvSpPr>
+          <p:nvPr>
+            <p:extLst>
+              <p:ext uri="{386F3935-93C4-4BCD-93E2-E3B085C9AB24}">
+                <p16:designElem xmlns:p16="http://schemas.microsoft.com/office/powerpoint/2015/main" val="1"/>
+              </p:ext>
+            </p:extLst>
+          </p:nvPr>
+        </p:nvSpPr>
+        <p:spPr>
+          <a:xfrm>
+            <a:off x="950614" y="965196"/>
+            <a:ext cx="6476539" cy="4781641"/>
+          </a:xfrm>
+          <a:prstGeom prst="rect">
+            <a:avLst/>
+          </a:prstGeom>
+          <a:solidFill>
+            <a:schemeClr val="tx1"/>
+          </a:solidFill>
+          <a:ln w="190500">
+            <a:solidFill>
+              <a:schemeClr val="tx1">
+                <a:alpha val="7000"/>
+              </a:schemeClr>
+            </a:solidFill>
+          </a:ln>
+        </p:spPr>
+        <p:style>
+          <a:lnRef idx="2">
+            <a:schemeClr val="accent1">
+              <a:shade val="50000"/>
+            </a:schemeClr>
+          </a:lnRef>
+          <a:fillRef idx="1">
+            <a:schemeClr val="accent1"/>
+          </a:fillRef>
+          <a:effectRef idx="0">
+            <a:schemeClr val="accent1"/>
+          </a:effectRef>
+          <a:fontRef idx="minor">
+            <a:schemeClr val="lt1"/>
+          </a:fontRef>
+        </p:style>
+        <p:txBody>
+          <a:bodyPr rtlCol="0" anchor="ctr"/>
+          <a:lstStyle/>
+          <a:p>
+            <a:pPr algn="ctr"/>
+            <a:endParaRPr lang="en-US"/>
+          </a:p>
+        </p:txBody>
+      </p:sp>
+      <p:pic>
+        <p:nvPicPr>
+          <p:cNvPr id="4" name="Picture 3" descr="Text, letter&#10;&#10;Description automatically generated">
+            <a:extLst>
+              <a:ext uri="{FF2B5EF4-FFF2-40B4-BE49-F238E27FC236}">
+                <a16:creationId xmlns:a16="http://schemas.microsoft.com/office/drawing/2014/main" id="{CE7776E4-5CA9-56DD-7084-87A6DFE122AE}"/>
+              </a:ext>
+            </a:extLst>
+          </p:cNvPr>
+          <p:cNvPicPr>
+            <a:picLocks noChangeAspect="1"/>
+          </p:cNvPicPr>
+          <p:nvPr/>
+        </p:nvPicPr>
+        <p:blipFill rotWithShape="1">
+          <a:blip r:embed="rId3"/>
+          <a:srcRect l="514" r="15376" b="3"/>
+          <a:stretch/>
+        </p:blipFill>
+        <p:spPr>
+          <a:xfrm>
+            <a:off x="1380489" y="1438360"/>
+            <a:ext cx="5562032" cy="3835314"/>
+          </a:xfrm>
+          <a:prstGeom prst="rect">
+            <a:avLst/>
+          </a:prstGeom>
+        </p:spPr>
+      </p:pic>
+    </p:spTree>
+    <p:extLst>
+      <p:ext uri="{BB962C8B-B14F-4D97-AF65-F5344CB8AC3E}">
+        <p14:creationId xmlns:p14="http://schemas.microsoft.com/office/powerpoint/2010/main" val="1442831529"/>
+      </p:ext>
+    </p:extLst>
+  </p:cSld>
+  <p:clrMapOvr>
+    <a:masterClrMapping/>
+  </p:clrMapOvr>
+</p:sld>
+</file>
+
+<file path=ppt/slides/slide13.xml><?xml version="1.0" encoding="utf-8"?>
+<p:sld xmlns:a="http://schemas.openxmlformats.org/drawingml/2006/main" xmlns:r="http://schemas.openxmlformats.org/officeDocument/2006/relationships" xmlns:p="http://schemas.openxmlformats.org/presentationml/2006/main">
+  <p:cSld>
+    <p:spTree>
+      <p:nvGrpSpPr>
+        <p:cNvPr id="1" name=""/>
+        <p:cNvGrpSpPr/>
+        <p:nvPr/>
+      </p:nvGrpSpPr>
+      <p:grpSpPr>
+        <a:xfrm>
+          <a:off x="0" y="0"/>
+          <a:ext cx="0" cy="0"/>
+          <a:chOff x="0" y="0"/>
+          <a:chExt cx="0" cy="0"/>
+        </a:xfrm>
+      </p:grpSpPr>
+      <p:sp>
+        <p:nvSpPr>
+          <p:cNvPr id="2" name="Title 1">
+            <a:extLst>
+              <a:ext uri="{FF2B5EF4-FFF2-40B4-BE49-F238E27FC236}">
+                <a16:creationId xmlns:a16="http://schemas.microsoft.com/office/drawing/2014/main" id="{9F9904BA-EB83-D80E-3C87-76326E256305}"/>
+              </a:ext>
+            </a:extLst>
+          </p:cNvPr>
+          <p:cNvSpPr>
+            <a:spLocks noGrp="1"/>
+          </p:cNvSpPr>
+          <p:nvPr>
+            <p:ph type="title"/>
+          </p:nvPr>
+        </p:nvSpPr>
+        <p:spPr/>
+        <p:txBody>
+          <a:bodyPr/>
+          <a:lstStyle/>
+          <a:p>
+            <a:r>
+              <a:rPr lang="en-US" dirty="0"/>
+              <a:t>Weather API</a:t>
+            </a:r>
+          </a:p>
+        </p:txBody>
+      </p:sp>
+      <p:sp>
+        <p:nvSpPr>
+          <p:cNvPr id="3" name="Content Placeholder 2">
+            <a:extLst>
+              <a:ext uri="{FF2B5EF4-FFF2-40B4-BE49-F238E27FC236}">
+                <a16:creationId xmlns:a16="http://schemas.microsoft.com/office/drawing/2014/main" id="{9C8D87AB-82A6-389E-B548-03168208847E}"/>
+              </a:ext>
+            </a:extLst>
+          </p:cNvPr>
+          <p:cNvSpPr>
+            <a:spLocks noGrp="1"/>
+          </p:cNvSpPr>
+          <p:nvPr>
+            <p:ph idx="1"/>
+          </p:nvPr>
+        </p:nvSpPr>
+        <p:spPr/>
+        <p:txBody>
+          <a:bodyPr/>
+          <a:lstStyle/>
+          <a:p>
+            <a:r>
+              <a:rPr lang="en-US" dirty="0">
+                <a:effectLst>
+                  <a:outerShdw blurRad="38100" dist="38100" dir="2700000" algn="tl">
+                    <a:srgbClr val="000000">
+                      <a:alpha val="43137"/>
+                    </a:srgbClr>
+                  </a:outerShdw>
+                </a:effectLst>
+              </a:rPr>
+              <a:t>https://rapidapi.com/weatherapi/api/weatherapi-com</a:t>
+            </a:r>
+          </a:p>
+        </p:txBody>
+      </p:sp>
+    </p:spTree>
+    <p:extLst>
+      <p:ext uri="{BB962C8B-B14F-4D97-AF65-F5344CB8AC3E}">
+        <p14:creationId xmlns:p14="http://schemas.microsoft.com/office/powerpoint/2010/main" val="543577936"/>
+      </p:ext>
+    </p:extLst>
+  </p:cSld>
+  <p:clrMapOvr>
+    <a:masterClrMapping/>
+  </p:clrMapOvr>
+</p:sld>
+</file>
+
+<file path=ppt/slides/slide14.xml><?xml version="1.0" encoding="utf-8"?>
+<p:sld xmlns:a="http://schemas.openxmlformats.org/drawingml/2006/main" xmlns:r="http://schemas.openxmlformats.org/officeDocument/2006/relationships" xmlns:p="http://schemas.openxmlformats.org/presentationml/2006/main">
+  <p:cSld>
+    <p:bg>
+      <p:bgPr>
+        <a:blipFill rotWithShape="1">
+          <a:blip r:embed="rId3">
+            <a:duotone>
+              <a:schemeClr val="bg2">
+                <a:shade val="80000"/>
+                <a:lumMod val="80000"/>
+              </a:schemeClr>
+              <a:schemeClr val="bg2">
+                <a:tint val="98000"/>
+              </a:schemeClr>
+            </a:duotone>
+          </a:blip>
+          <a:stretch/>
+        </a:blipFill>
+        <a:effectLst/>
+      </p:bgPr>
+    </p:bg>
+    <p:spTree>
+      <p:nvGrpSpPr>
+        <p:cNvPr id="1" name=""/>
+        <p:cNvGrpSpPr/>
+        <p:nvPr/>
+      </p:nvGrpSpPr>
+      <p:grpSpPr>
+        <a:xfrm>
+          <a:off x="0" y="0"/>
+          <a:ext cx="0" cy="0"/>
+          <a:chOff x="0" y="0"/>
+          <a:chExt cx="0" cy="0"/>
+        </a:xfrm>
+      </p:grpSpPr>
+      <p:sp>
+        <p:nvSpPr>
+          <p:cNvPr id="10" name="Rectangle 9">
+            <a:extLst>
+              <a:ext uri="{FF2B5EF4-FFF2-40B4-BE49-F238E27FC236}">
+                <a16:creationId xmlns:a16="http://schemas.microsoft.com/office/drawing/2014/main" id="{D64A12F0-8158-4372-9761-AD0A6ED30C2E}"/>
+              </a:ext>
+              <a:ext uri="{C183D7F6-B498-43B3-948B-1728B52AA6E4}">
+                <adec:decorative xmlns:adec="http://schemas.microsoft.com/office/drawing/2017/decorative" val="1"/>
+              </a:ext>
+            </a:extLst>
+          </p:cNvPr>
+          <p:cNvSpPr>
+            <a:spLocks noGrp="1" noRot="1" noChangeAspect="1" noMove="1" noResize="1" noEditPoints="1" noAdjustHandles="1" noChangeArrowheads="1" noChangeShapeType="1" noTextEdit="1"/>
+          </p:cNvSpPr>
+          <p:nvPr>
+            <p:extLst>
+              <p:ext uri="{386F3935-93C4-4BCD-93E2-E3B085C9AB24}">
+                <p16:designElem xmlns:p16="http://schemas.microsoft.com/office/powerpoint/2015/main" val="1"/>
+              </p:ext>
+            </p:extLst>
+          </p:nvPr>
+        </p:nvSpPr>
+        <p:spPr>
+          <a:xfrm>
+            <a:off x="0" y="0"/>
+            <a:ext cx="12192000" cy="6858000"/>
+          </a:xfrm>
+          <a:prstGeom prst="rect">
+            <a:avLst/>
+          </a:prstGeom>
+          <a:solidFill>
+            <a:schemeClr val="bg2"/>
+          </a:solidFill>
+          <a:ln>
+            <a:noFill/>
+          </a:ln>
+        </p:spPr>
+        <p:style>
+          <a:lnRef idx="2">
+            <a:schemeClr val="accent1">
+              <a:shade val="50000"/>
+            </a:schemeClr>
+          </a:lnRef>
+          <a:fillRef idx="1">
+            <a:schemeClr val="accent1"/>
+          </a:fillRef>
+          <a:effectRef idx="0">
+            <a:schemeClr val="accent1"/>
+          </a:effectRef>
+          <a:fontRef idx="minor">
+            <a:schemeClr val="lt1"/>
+          </a:fontRef>
+        </p:style>
+        <p:txBody>
+          <a:bodyPr rtlCol="0" anchor="ctr"/>
+          <a:lstStyle/>
+          <a:p>
+            <a:pPr algn="ctr"/>
+            <a:endParaRPr lang="en-US"/>
+          </a:p>
+        </p:txBody>
+      </p:sp>
+      <p:pic>
+        <p:nvPicPr>
+          <p:cNvPr id="5" name="Picture 4" descr="Graphical user interface, text, application&#10;&#10;Description automatically generated">
+            <a:extLst>
+              <a:ext uri="{FF2B5EF4-FFF2-40B4-BE49-F238E27FC236}">
+                <a16:creationId xmlns:a16="http://schemas.microsoft.com/office/drawing/2014/main" id="{C9F2630B-6A70-6167-F37D-97831177EA64}"/>
+              </a:ext>
+            </a:extLst>
+          </p:cNvPr>
+          <p:cNvPicPr>
+            <a:picLocks noChangeAspect="1"/>
+          </p:cNvPicPr>
+          <p:nvPr/>
+        </p:nvPicPr>
+        <p:blipFill>
+          <a:blip r:embed="rId4"/>
+          <a:stretch>
+            <a:fillRect/>
+          </a:stretch>
+        </p:blipFill>
+        <p:spPr>
+          <a:xfrm>
+            <a:off x="3314244" y="967532"/>
+            <a:ext cx="5563511" cy="4922936"/>
+          </a:xfrm>
+          <a:prstGeom prst="rect">
+            <a:avLst/>
+          </a:prstGeom>
+          <a:ln w="190500">
+            <a:solidFill>
+              <a:schemeClr val="tx1">
+                <a:alpha val="7000"/>
+              </a:schemeClr>
+            </a:solidFill>
+          </a:ln>
+        </p:spPr>
+      </p:pic>
+    </p:spTree>
+    <p:extLst>
+      <p:ext uri="{BB962C8B-B14F-4D97-AF65-F5344CB8AC3E}">
+        <p14:creationId xmlns:p14="http://schemas.microsoft.com/office/powerpoint/2010/main" val="272553218"/>
+      </p:ext>
+    </p:extLst>
+  </p:cSld>
+  <p:clrMapOvr>
+    <a:masterClrMapping/>
+  </p:clrMapOvr>
+</p:sld>
+</file>
+
+<file path=ppt/slides/slide15.xml><?xml version="1.0" encoding="utf-8"?>
+<p:sld xmlns:a="http://schemas.openxmlformats.org/drawingml/2006/main" xmlns:r="http://schemas.openxmlformats.org/officeDocument/2006/relationships" xmlns:p="http://schemas.openxmlformats.org/presentationml/2006/main">
+  <p:cSld>
+    <p:bg>
+      <p:bgPr>
+        <a:blipFill rotWithShape="1">
+          <a:blip r:embed="rId2">
+            <a:duotone>
+              <a:schemeClr val="bg2">
+                <a:shade val="80000"/>
+                <a:lumMod val="80000"/>
+              </a:schemeClr>
+              <a:schemeClr val="bg2">
+                <a:tint val="98000"/>
+              </a:schemeClr>
+            </a:duotone>
+          </a:blip>
+          <a:stretch/>
+        </a:blipFill>
+        <a:effectLst/>
+      </p:bgPr>
+    </p:bg>
+    <p:spTree>
+      <p:nvGrpSpPr>
+        <p:cNvPr id="1" name=""/>
+        <p:cNvGrpSpPr/>
+        <p:nvPr/>
+      </p:nvGrpSpPr>
+      <p:grpSpPr>
+        <a:xfrm>
+          <a:off x="0" y="0"/>
+          <a:ext cx="0" cy="0"/>
+          <a:chOff x="0" y="0"/>
+          <a:chExt cx="0" cy="0"/>
+        </a:xfrm>
+      </p:grpSpPr>
+      <p:sp>
+        <p:nvSpPr>
+          <p:cNvPr id="2" name="Title 1">
+            <a:extLst>
+              <a:ext uri="{FF2B5EF4-FFF2-40B4-BE49-F238E27FC236}">
+                <a16:creationId xmlns:a16="http://schemas.microsoft.com/office/drawing/2014/main" id="{9699BB10-D953-4E3C-098C-14C06B316910}"/>
+              </a:ext>
+            </a:extLst>
+          </p:cNvPr>
+          <p:cNvSpPr>
+            <a:spLocks noGrp="1"/>
+          </p:cNvSpPr>
+          <p:nvPr>
+            <p:ph type="title"/>
+          </p:nvPr>
+        </p:nvSpPr>
+        <p:spPr>
+          <a:xfrm>
+            <a:off x="1370693" y="4406537"/>
+            <a:ext cx="9440034" cy="1088336"/>
+          </a:xfrm>
+        </p:spPr>
+        <p:txBody>
+          <a:bodyPr vert="horz" lIns="91440" tIns="45720" rIns="91440" bIns="45720" rtlCol="0" anchor="b">
+            <a:normAutofit/>
+          </a:bodyPr>
+          <a:lstStyle/>
+          <a:p>
+            <a:r>
+              <a:rPr lang="en-US" sz="4800"/>
+              <a:t>Securing APIs</a:t>
+            </a:r>
+          </a:p>
+        </p:txBody>
+      </p:sp>
+      <p:sp>
+        <p:nvSpPr>
+          <p:cNvPr id="3" name="Text Placeholder 2">
+            <a:extLst>
+              <a:ext uri="{FF2B5EF4-FFF2-40B4-BE49-F238E27FC236}">
+                <a16:creationId xmlns:a16="http://schemas.microsoft.com/office/drawing/2014/main" id="{D80EA98A-E511-4EFE-C174-52517710B712}"/>
+              </a:ext>
+            </a:extLst>
+          </p:cNvPr>
+          <p:cNvSpPr>
+            <a:spLocks noGrp="1"/>
+          </p:cNvSpPr>
+          <p:nvPr>
+            <p:ph type="body" idx="1"/>
+          </p:nvPr>
+        </p:nvSpPr>
+        <p:spPr>
+          <a:xfrm>
+            <a:off x="1370693" y="5494872"/>
+            <a:ext cx="9440034" cy="621614"/>
+          </a:xfrm>
+        </p:spPr>
+        <p:txBody>
+          <a:bodyPr vert="horz" lIns="91440" tIns="45720" rIns="91440" bIns="45720" rtlCol="0" anchor="t">
+            <a:normAutofit/>
+          </a:bodyPr>
+          <a:lstStyle/>
+          <a:p>
+            <a:endParaRPr lang="en-US">
+              <a:solidFill>
+                <a:srgbClr val="836534"/>
+              </a:solidFill>
+            </a:endParaRPr>
+          </a:p>
+        </p:txBody>
+      </p:sp>
+      <p:pic>
+        <p:nvPicPr>
+          <p:cNvPr id="9" name="Picture 8">
+            <a:extLst>
+              <a:ext uri="{FF2B5EF4-FFF2-40B4-BE49-F238E27FC236}">
+                <a16:creationId xmlns:a16="http://schemas.microsoft.com/office/drawing/2014/main" id="{2BFB581C-2142-4222-9A3B-905AD6C09535}"/>
+              </a:ext>
+              <a:ext uri="{C183D7F6-B498-43B3-948B-1728B52AA6E4}">
+                <adec:decorative xmlns:adec="http://schemas.microsoft.com/office/drawing/2017/decorative" val="1"/>
+              </a:ext>
+            </a:extLst>
+          </p:cNvPr>
+          <p:cNvPicPr>
+            <a:picLocks noGrp="1" noRot="1" noChangeAspect="1" noMove="1" noResize="1" noEditPoints="1" noAdjustHandles="1" noChangeArrowheads="1" noChangeShapeType="1" noCrop="1"/>
+          </p:cNvPicPr>
+          <p:nvPr>
+            <p:extLst>
+              <p:ext uri="{386F3935-93C4-4BCD-93E2-E3B085C9AB24}">
+                <p16:designElem xmlns:p16="http://schemas.microsoft.com/office/powerpoint/2015/main" val="1"/>
+              </p:ext>
+            </p:extLst>
+          </p:nvPr>
+        </p:nvPicPr>
+        <p:blipFill rotWithShape="1">
+          <a:blip r:embed="rId3">
+            <a:extLst>
+              <a:ext uri="{28A0092B-C50C-407E-A947-70E740481C1C}">
+                <a14:useLocalDpi xmlns:a14="http://schemas.microsoft.com/office/drawing/2010/main" val="0"/>
+              </a:ext>
+            </a:extLst>
+          </a:blip>
+          <a:srcRect l="798" t="2669" r="616"/>
+          <a:stretch/>
+        </p:blipFill>
+        <p:spPr>
+          <a:xfrm>
+            <a:off x="-1" y="0"/>
+            <a:ext cx="12192001" cy="4322278"/>
+          </a:xfrm>
+          <a:prstGeom prst="rect">
+            <a:avLst/>
+          </a:prstGeom>
+        </p:spPr>
+      </p:pic>
+      <p:pic>
+        <p:nvPicPr>
+          <p:cNvPr id="5" name="Picture 4">
+            <a:extLst>
+              <a:ext uri="{FF2B5EF4-FFF2-40B4-BE49-F238E27FC236}">
+                <a16:creationId xmlns:a16="http://schemas.microsoft.com/office/drawing/2014/main" id="{D70D4FBC-E1A0-E8C6-7725-0B7F3F68E766}"/>
+              </a:ext>
+            </a:extLst>
+          </p:cNvPr>
+          <p:cNvPicPr>
+            <a:picLocks noChangeAspect="1"/>
+          </p:cNvPicPr>
+          <p:nvPr/>
+        </p:nvPicPr>
+        <p:blipFill rotWithShape="1">
+          <a:blip r:embed="rId4"/>
+          <a:srcRect t="7085" r="-1" b="31405"/>
+          <a:stretch/>
+        </p:blipFill>
+        <p:spPr>
+          <a:xfrm>
+            <a:off x="-1" y="-1"/>
+            <a:ext cx="12198915" cy="4220682"/>
+          </a:xfrm>
+          <a:prstGeom prst="rect">
+            <a:avLst/>
+          </a:prstGeom>
+        </p:spPr>
+      </p:pic>
+    </p:spTree>
+    <p:extLst>
+      <p:ext uri="{BB962C8B-B14F-4D97-AF65-F5344CB8AC3E}">
+        <p14:creationId xmlns:p14="http://schemas.microsoft.com/office/powerpoint/2010/main" val="1996113951"/>
+      </p:ext>
+    </p:extLst>
+  </p:cSld>
+  <p:clrMapOvr>
+    <a:masterClrMapping/>
+  </p:clrMapOvr>
+</p:sld>
+</file>
+
+<file path=ppt/slides/slide16.xml><?xml version="1.0" encoding="utf-8"?>
+<p:sld xmlns:a="http://schemas.openxmlformats.org/drawingml/2006/main" xmlns:r="http://schemas.openxmlformats.org/officeDocument/2006/relationships" xmlns:p="http://schemas.openxmlformats.org/presentationml/2006/main">
+  <p:cSld>
+    <p:bg>
+      <p:bgPr>
+        <a:blipFill rotWithShape="1">
+          <a:blip r:embed="rId3">
+            <a:duotone>
+              <a:schemeClr val="bg2">
+                <a:shade val="80000"/>
+                <a:lumMod val="80000"/>
+              </a:schemeClr>
+              <a:schemeClr val="bg2">
+                <a:tint val="98000"/>
+              </a:schemeClr>
+            </a:duotone>
+          </a:blip>
+          <a:stretch/>
+        </a:blipFill>
+        <a:effectLst/>
+      </p:bgPr>
+    </p:bg>
+    <p:spTree>
+      <p:nvGrpSpPr>
+        <p:cNvPr id="1" name=""/>
+        <p:cNvGrpSpPr/>
+        <p:nvPr/>
+      </p:nvGrpSpPr>
+      <p:grpSpPr>
+        <a:xfrm>
+          <a:off x="0" y="0"/>
+          <a:ext cx="0" cy="0"/>
+          <a:chOff x="0" y="0"/>
+          <a:chExt cx="0" cy="0"/>
+        </a:xfrm>
+      </p:grpSpPr>
+      <p:sp>
+        <p:nvSpPr>
+          <p:cNvPr id="2" name="Title 1">
+            <a:extLst>
+              <a:ext uri="{FF2B5EF4-FFF2-40B4-BE49-F238E27FC236}">
+                <a16:creationId xmlns:a16="http://schemas.microsoft.com/office/drawing/2014/main" id="{21BF4D03-BD03-DAC4-BD45-155F165873FF}"/>
+              </a:ext>
+            </a:extLst>
+          </p:cNvPr>
+          <p:cNvSpPr>
+            <a:spLocks noGrp="1"/>
+          </p:cNvSpPr>
+          <p:nvPr>
+            <p:ph type="title"/>
+          </p:nvPr>
+        </p:nvSpPr>
+        <p:spPr>
+          <a:xfrm>
+            <a:off x="861791" y="835383"/>
+            <a:ext cx="3382832" cy="3499549"/>
+          </a:xfrm>
+        </p:spPr>
+        <p:txBody>
+          <a:bodyPr vert="horz" lIns="91440" tIns="45720" rIns="91440" bIns="45720" rtlCol="0" anchor="b">
+            <a:normAutofit/>
+          </a:bodyPr>
+          <a:lstStyle/>
+          <a:p>
+            <a:pPr algn="l"/>
+            <a:r>
+              <a:rPr lang="en-US" sz="4200"/>
+              <a:t>What is Oauth?</a:t>
+            </a:r>
+          </a:p>
+        </p:txBody>
+      </p:sp>
+      <p:pic>
+        <p:nvPicPr>
+          <p:cNvPr id="22" name="Picture 21">
+            <a:extLst>
+              <a:ext uri="{FF2B5EF4-FFF2-40B4-BE49-F238E27FC236}">
+                <a16:creationId xmlns:a16="http://schemas.microsoft.com/office/drawing/2014/main" id="{08187575-5CB4-477B-AA47-020C6D2A786E}"/>
+              </a:ext>
+              <a:ext uri="{C183D7F6-B498-43B3-948B-1728B52AA6E4}">
+                <adec:decorative xmlns:adec="http://schemas.microsoft.com/office/drawing/2017/decorative" val="1"/>
+              </a:ext>
+            </a:extLst>
+          </p:cNvPr>
+          <p:cNvPicPr>
+            <a:picLocks noGrp="1" noRot="1" noChangeAspect="1" noMove="1" noResize="1" noEditPoints="1" noAdjustHandles="1" noChangeArrowheads="1" noChangeShapeType="1" noCrop="1"/>
+          </p:cNvPicPr>
+          <p:nvPr>
+            <p:extLst>
+              <p:ext uri="{386F3935-93C4-4BCD-93E2-E3B085C9AB24}">
+                <p16:designElem xmlns:p16="http://schemas.microsoft.com/office/powerpoint/2015/main" val="1"/>
+              </p:ext>
+            </p:extLst>
+          </p:nvPr>
+        </p:nvPicPr>
+        <p:blipFill rotWithShape="1">
+          <a:blip r:embed="rId4">
+            <a:extLst>
+              <a:ext uri="{28A0092B-C50C-407E-A947-70E740481C1C}">
+                <a14:useLocalDpi xmlns:a14="http://schemas.microsoft.com/office/drawing/2010/main" val="0"/>
+              </a:ext>
+            </a:extLst>
+          </a:blip>
+          <a:srcRect t="964" r="2807" b="1446"/>
+          <a:stretch/>
+        </p:blipFill>
+        <p:spPr>
+          <a:xfrm>
+            <a:off x="4552950" y="1"/>
+            <a:ext cx="7639050" cy="6858000"/>
+          </a:xfrm>
+          <a:prstGeom prst="rect">
+            <a:avLst/>
+          </a:prstGeom>
+        </p:spPr>
+      </p:pic>
+      <p:pic>
+        <p:nvPicPr>
+          <p:cNvPr id="24" name="Picture 23">
+            <a:extLst>
+              <a:ext uri="{FF2B5EF4-FFF2-40B4-BE49-F238E27FC236}">
+                <a16:creationId xmlns:a16="http://schemas.microsoft.com/office/drawing/2014/main" id="{EE585F70-7C5D-424E-A182-39507AF48A0C}"/>
+              </a:ext>
+              <a:ext uri="{C183D7F6-B498-43B3-948B-1728B52AA6E4}">
+                <adec:decorative xmlns:adec="http://schemas.microsoft.com/office/drawing/2017/decorative" val="1"/>
+              </a:ext>
+            </a:extLst>
+          </p:cNvPr>
+          <p:cNvPicPr>
+            <a:picLocks noGrp="1" noRot="1" noChangeAspect="1" noMove="1" noResize="1" noEditPoints="1" noAdjustHandles="1" noChangeArrowheads="1" noChangeShapeType="1" noCrop="1"/>
+          </p:cNvPicPr>
+          <p:nvPr>
+            <p:extLst>
+              <p:ext uri="{386F3935-93C4-4BCD-93E2-E3B085C9AB24}">
+                <p16:designElem xmlns:p16="http://schemas.microsoft.com/office/powerpoint/2015/main" val="1"/>
+              </p:ext>
+            </p:extLst>
+          </p:nvPr>
+        </p:nvPicPr>
+        <p:blipFill rotWithShape="1">
+          <a:blip r:embed="rId4">
+            <a:extLst>
+              <a:ext uri="{28A0092B-C50C-407E-A947-70E740481C1C}">
+                <a14:useLocalDpi xmlns:a14="http://schemas.microsoft.com/office/drawing/2010/main" val="0"/>
+              </a:ext>
+            </a:extLst>
+          </a:blip>
+          <a:srcRect t="964" r="2807" b="1446"/>
+          <a:stretch/>
+        </p:blipFill>
+        <p:spPr>
+          <a:xfrm>
+            <a:off x="7501468" y="1"/>
+            <a:ext cx="4690532" cy="6858000"/>
+          </a:xfrm>
+          <a:prstGeom prst="rect">
+            <a:avLst/>
+          </a:prstGeom>
+        </p:spPr>
+      </p:pic>
+      <p:pic>
+        <p:nvPicPr>
+          <p:cNvPr id="6" name="Picture 5" descr="Logo&#10;&#10;Description automatically generated">
+            <a:extLst>
+              <a:ext uri="{FF2B5EF4-FFF2-40B4-BE49-F238E27FC236}">
+                <a16:creationId xmlns:a16="http://schemas.microsoft.com/office/drawing/2014/main" id="{E5274FD0-050A-DF16-2A61-FC89CDDB5226}"/>
+              </a:ext>
+            </a:extLst>
+          </p:cNvPr>
+          <p:cNvPicPr>
+            <a:picLocks noChangeAspect="1"/>
+          </p:cNvPicPr>
+          <p:nvPr/>
+        </p:nvPicPr>
+        <p:blipFill rotWithShape="1">
+          <a:blip r:embed="rId5"/>
+          <a:srcRect t="1039" r="-3" b="8204"/>
+          <a:stretch/>
+        </p:blipFill>
+        <p:spPr>
+          <a:xfrm>
+            <a:off x="4654297" y="10"/>
+            <a:ext cx="7537704" cy="6857990"/>
+          </a:xfrm>
+          <a:prstGeom prst="rect">
+            <a:avLst/>
+          </a:prstGeom>
+        </p:spPr>
+      </p:pic>
+    </p:spTree>
+    <p:extLst>
+      <p:ext uri="{BB962C8B-B14F-4D97-AF65-F5344CB8AC3E}">
+        <p14:creationId xmlns:p14="http://schemas.microsoft.com/office/powerpoint/2010/main" val="2559449484"/>
+      </p:ext>
+    </p:extLst>
+  </p:cSld>
+  <p:clrMapOvr>
+    <a:masterClrMapping/>
+  </p:clrMapOvr>
+</p:sld>
+</file>
+
+<file path=ppt/slides/slide17.xml><?xml version="1.0" encoding="utf-8"?>
+<p:sld xmlns:a="http://schemas.openxmlformats.org/drawingml/2006/main" xmlns:r="http://schemas.openxmlformats.org/officeDocument/2006/relationships" xmlns:p="http://schemas.openxmlformats.org/presentationml/2006/main">
+  <p:cSld>
+    <p:spTree>
+      <p:nvGrpSpPr>
+        <p:cNvPr id="1" name=""/>
+        <p:cNvGrpSpPr/>
+        <p:nvPr/>
+      </p:nvGrpSpPr>
+      <p:grpSpPr>
+        <a:xfrm>
+          <a:off x="0" y="0"/>
+          <a:ext cx="0" cy="0"/>
+          <a:chOff x="0" y="0"/>
+          <a:chExt cx="0" cy="0"/>
+        </a:xfrm>
+      </p:grpSpPr>
+      <p:sp>
+        <p:nvSpPr>
+          <p:cNvPr id="2" name="Title 1">
+            <a:extLst>
+              <a:ext uri="{FF2B5EF4-FFF2-40B4-BE49-F238E27FC236}">
+                <a16:creationId xmlns:a16="http://schemas.microsoft.com/office/drawing/2014/main" id="{B401AA53-CB3A-8EF2-7C9D-70B19BF8F561}"/>
+              </a:ext>
+            </a:extLst>
+          </p:cNvPr>
+          <p:cNvSpPr>
+            <a:spLocks noGrp="1"/>
+          </p:cNvSpPr>
+          <p:nvPr>
+            <p:ph type="title"/>
+          </p:nvPr>
+        </p:nvSpPr>
+        <p:spPr/>
+        <p:txBody>
+          <a:bodyPr/>
+          <a:lstStyle/>
+          <a:p>
+            <a:r>
+              <a:rPr lang="en-US" dirty="0"/>
+              <a:t>How does </a:t>
+            </a:r>
+            <a:r>
+              <a:rPr lang="en-US" dirty="0" err="1"/>
+              <a:t>oauth</a:t>
+            </a:r>
+            <a:r>
+              <a:rPr lang="en-US" dirty="0"/>
+              <a:t> work?</a:t>
+            </a:r>
+          </a:p>
+        </p:txBody>
+      </p:sp>
+      <p:pic>
+        <p:nvPicPr>
+          <p:cNvPr id="3" name="Picture 2" descr="Diagram&#10;&#10;Description automatically generated with low confidence">
+            <a:extLst>
+              <a:ext uri="{FF2B5EF4-FFF2-40B4-BE49-F238E27FC236}">
+                <a16:creationId xmlns:a16="http://schemas.microsoft.com/office/drawing/2014/main" id="{5D5F0843-A33F-DC5E-B0B4-E94D73EFBE9F}"/>
+              </a:ext>
+            </a:extLst>
+          </p:cNvPr>
+          <p:cNvPicPr>
+            <a:picLocks noChangeAspect="1"/>
+          </p:cNvPicPr>
+          <p:nvPr/>
+        </p:nvPicPr>
+        <p:blipFill>
+          <a:blip r:embed="rId2"/>
+          <a:stretch>
+            <a:fillRect/>
+          </a:stretch>
+        </p:blipFill>
+        <p:spPr>
+          <a:xfrm>
+            <a:off x="1380489" y="1687407"/>
+            <a:ext cx="5562032" cy="3337219"/>
+          </a:xfrm>
+          <a:prstGeom prst="rect">
+            <a:avLst/>
+          </a:prstGeom>
+        </p:spPr>
+      </p:pic>
+    </p:spTree>
+    <p:extLst>
+      <p:ext uri="{BB962C8B-B14F-4D97-AF65-F5344CB8AC3E}">
+        <p14:creationId xmlns:p14="http://schemas.microsoft.com/office/powerpoint/2010/main" val="2437315508"/>
+      </p:ext>
+    </p:extLst>
+  </p:cSld>
+  <p:clrMapOvr>
+    <a:masterClrMapping/>
+  </p:clrMapOvr>
+</p:sld>
+</file>
+
+<file path=ppt/slides/slide18.xml><?xml version="1.0" encoding="utf-8"?>
+<p:sld xmlns:a="http://schemas.openxmlformats.org/drawingml/2006/main" xmlns:r="http://schemas.openxmlformats.org/officeDocument/2006/relationships" xmlns:p="http://schemas.openxmlformats.org/presentationml/2006/main">
+  <p:cSld>
+    <p:spTree>
+      <p:nvGrpSpPr>
+        <p:cNvPr id="1" name=""/>
+        <p:cNvGrpSpPr/>
+        <p:nvPr/>
+      </p:nvGrpSpPr>
+      <p:grpSpPr>
+        <a:xfrm>
+          <a:off x="0" y="0"/>
+          <a:ext cx="0" cy="0"/>
+          <a:chOff x="0" y="0"/>
+          <a:chExt cx="0" cy="0"/>
+        </a:xfrm>
+      </p:grpSpPr>
+      <p:sp>
+        <p:nvSpPr>
+          <p:cNvPr id="2" name="Title 1">
+            <a:extLst>
+              <a:ext uri="{FF2B5EF4-FFF2-40B4-BE49-F238E27FC236}">
+                <a16:creationId xmlns:a16="http://schemas.microsoft.com/office/drawing/2014/main" id="{2FD098B1-0412-424E-49DE-3F80E7AA8349}"/>
+              </a:ext>
+            </a:extLst>
+          </p:cNvPr>
+          <p:cNvSpPr>
+            <a:spLocks noGrp="1"/>
+          </p:cNvSpPr>
+          <p:nvPr>
+            <p:ph type="title"/>
+          </p:nvPr>
+        </p:nvSpPr>
+        <p:spPr/>
+        <p:txBody>
+          <a:bodyPr>
+            <a:normAutofit/>
+          </a:bodyPr>
+          <a:lstStyle/>
+          <a:p>
+            <a:r>
+              <a:rPr lang="en-US" dirty="0"/>
+              <a:t>The Software Development Life Cycle</a:t>
+            </a:r>
+          </a:p>
+        </p:txBody>
+      </p:sp>
+      <p:sp>
+        <p:nvSpPr>
+          <p:cNvPr id="3" name="Text Placeholder 2">
+            <a:extLst>
+              <a:ext uri="{FF2B5EF4-FFF2-40B4-BE49-F238E27FC236}">
+                <a16:creationId xmlns:a16="http://schemas.microsoft.com/office/drawing/2014/main" id="{9E791FFB-9F3B-75BA-D539-11E5BAB941EF}"/>
+              </a:ext>
+            </a:extLst>
+          </p:cNvPr>
+          <p:cNvSpPr>
+            <a:spLocks noGrp="1"/>
+          </p:cNvSpPr>
+          <p:nvPr>
+            <p:ph type="body" idx="1"/>
+          </p:nvPr>
+        </p:nvSpPr>
+        <p:spPr/>
+        <p:txBody>
+          <a:bodyPr/>
+          <a:lstStyle/>
+          <a:p>
+            <a:endParaRPr lang="en-US"/>
+          </a:p>
+        </p:txBody>
+      </p:sp>
+    </p:spTree>
+    <p:extLst>
+      <p:ext uri="{BB962C8B-B14F-4D97-AF65-F5344CB8AC3E}">
+        <p14:creationId xmlns:p14="http://schemas.microsoft.com/office/powerpoint/2010/main" val="3076984293"/>
+      </p:ext>
+    </p:extLst>
+  </p:cSld>
+  <p:clrMapOvr>
+    <a:masterClrMapping/>
+  </p:clrMapOvr>
+</p:sld>
+</file>
+
+<file path=ppt/slides/slide19.xml><?xml version="1.0" encoding="utf-8"?>
+<p:sld xmlns:a="http://schemas.openxmlformats.org/drawingml/2006/main" xmlns:r="http://schemas.openxmlformats.org/officeDocument/2006/relationships" xmlns:p="http://schemas.openxmlformats.org/presentationml/2006/main">
+  <p:cSld>
+    <p:spTree>
+      <p:nvGrpSpPr>
+        <p:cNvPr id="1" name=""/>
+        <p:cNvGrpSpPr/>
+        <p:nvPr/>
+      </p:nvGrpSpPr>
+      <p:grpSpPr>
+        <a:xfrm>
+          <a:off x="0" y="0"/>
+          <a:ext cx="0" cy="0"/>
+          <a:chOff x="0" y="0"/>
+          <a:chExt cx="0" cy="0"/>
+        </a:xfrm>
+      </p:grpSpPr>
+      <p:sp>
+        <p:nvSpPr>
+          <p:cNvPr id="2" name="Title 1">
+            <a:extLst>
+              <a:ext uri="{FF2B5EF4-FFF2-40B4-BE49-F238E27FC236}">
+                <a16:creationId xmlns:a16="http://schemas.microsoft.com/office/drawing/2014/main" id="{047B3247-CD57-A68D-86CB-226AD9D932CC}"/>
+              </a:ext>
+            </a:extLst>
+          </p:cNvPr>
+          <p:cNvSpPr>
+            <a:spLocks noGrp="1"/>
+          </p:cNvSpPr>
+          <p:nvPr>
+            <p:ph type="title"/>
+          </p:nvPr>
+        </p:nvSpPr>
+        <p:spPr/>
+        <p:txBody>
+          <a:bodyPr>
+            <a:normAutofit/>
+          </a:bodyPr>
+          <a:lstStyle/>
+          <a:p>
+            <a:r>
+              <a:rPr lang="en-US" dirty="0"/>
+              <a:t>What is the Software Development Life Cycle?</a:t>
+            </a:r>
+          </a:p>
+        </p:txBody>
+      </p:sp>
+      <p:sp>
+        <p:nvSpPr>
+          <p:cNvPr id="3" name="Content Placeholder 2">
+            <a:extLst>
+              <a:ext uri="{FF2B5EF4-FFF2-40B4-BE49-F238E27FC236}">
+                <a16:creationId xmlns:a16="http://schemas.microsoft.com/office/drawing/2014/main" id="{940F9860-AD79-8C22-AF4B-170D69ACC5C7}"/>
+              </a:ext>
+            </a:extLst>
+          </p:cNvPr>
+          <p:cNvSpPr>
+            <a:spLocks noGrp="1"/>
+          </p:cNvSpPr>
+          <p:nvPr>
+            <p:ph idx="1"/>
+          </p:nvPr>
+        </p:nvSpPr>
+        <p:spPr/>
+        <p:txBody>
+          <a:bodyPr/>
+          <a:lstStyle/>
+          <a:p>
+            <a:r>
+              <a:rPr lang="en-US" dirty="0"/>
+              <a:t>The SDLC helps us organize the process of building software</a:t>
+            </a:r>
+          </a:p>
+          <a:p>
+            <a:r>
+              <a:rPr lang="en-US" dirty="0"/>
+              <a:t>Includes steps for building, revising, and deploying software</a:t>
+            </a:r>
+          </a:p>
+          <a:p>
+            <a:r>
+              <a:rPr lang="en-US" dirty="0"/>
+              <a:t>Includes roles associated with each step along the building process</a:t>
+            </a:r>
+          </a:p>
+        </p:txBody>
+      </p:sp>
+    </p:spTree>
+    <p:extLst>
+      <p:ext uri="{BB962C8B-B14F-4D97-AF65-F5344CB8AC3E}">
+        <p14:creationId xmlns:p14="http://schemas.microsoft.com/office/powerpoint/2010/main" val="2158119916"/>
+      </p:ext>
+    </p:extLst>
+  </p:cSld>
+  <p:clrMapOvr>
+    <a:masterClrMapping/>
+  </p:clrMapOvr>
+</p:sld>
+</file>
+
+<file path=ppt/slides/slide2.xml><?xml version="1.0" encoding="utf-8"?>
+<p:sld xmlns:a="http://schemas.openxmlformats.org/drawingml/2006/main" xmlns:r="http://schemas.openxmlformats.org/officeDocument/2006/relationships" xmlns:p="http://schemas.openxmlformats.org/presentationml/2006/main">
+  <p:cSld>
+    <p:bg>
+      <p:bgPr>
+        <a:blipFill rotWithShape="1">
+          <a:blip r:embed="rId2">
+            <a:duotone>
+              <a:schemeClr val="bg2">
+                <a:shade val="80000"/>
+                <a:lumMod val="80000"/>
+              </a:schemeClr>
+              <a:schemeClr val="bg2">
+                <a:tint val="98000"/>
+              </a:schemeClr>
+            </a:duotone>
+          </a:blip>
+          <a:stretch/>
+        </a:blipFill>
+        <a:effectLst/>
+      </p:bgPr>
+    </p:bg>
+    <p:spTree>
+      <p:nvGrpSpPr>
+        <p:cNvPr id="1" name=""/>
+        <p:cNvGrpSpPr/>
+        <p:nvPr/>
+      </p:nvGrpSpPr>
+      <p:grpSpPr>
+        <a:xfrm>
+          <a:off x="0" y="0"/>
+          <a:ext cx="0" cy="0"/>
+          <a:chOff x="0" y="0"/>
+          <a:chExt cx="0" cy="0"/>
+        </a:xfrm>
+      </p:grpSpPr>
+      <p:sp useBgFill="1">
+        <p:nvSpPr>
+          <p:cNvPr id="4" name="Rectangle 6">
+            <a:extLst>
+              <a:ext uri="{FF2B5EF4-FFF2-40B4-BE49-F238E27FC236}">
+                <a16:creationId xmlns:a16="http://schemas.microsoft.com/office/drawing/2014/main" id="{DAB482FD-C684-4DAA-AC4C-1739F51A98A0}"/>
+              </a:ext>
+              <a:ext uri="{C183D7F6-B498-43B3-948B-1728B52AA6E4}">
+                <adec:decorative xmlns:adec="http://schemas.microsoft.com/office/drawing/2017/decorative" val="1"/>
+              </a:ext>
+            </a:extLst>
+          </p:cNvPr>
+          <p:cNvSpPr>
+            <a:spLocks noGrp="1" noRot="1" noChangeAspect="1" noMove="1" noResize="1" noEditPoints="1" noAdjustHandles="1" noChangeArrowheads="1" noChangeShapeType="1" noTextEdit="1"/>
+          </p:cNvSpPr>
+          <p:nvPr>
+            <p:extLst>
+              <p:ext uri="{386F3935-93C4-4BCD-93E2-E3B085C9AB24}">
+                <p16:designElem xmlns:p16="http://schemas.microsoft.com/office/powerpoint/2015/main" val="1"/>
+              </p:ext>
+            </p:extLst>
+          </p:nvPr>
+        </p:nvSpPr>
+        <p:spPr>
+          <a:xfrm>
+            <a:off x="0" y="0"/>
+            <a:ext cx="12192000" cy="6858000"/>
+          </a:xfrm>
+          <a:prstGeom prst="rect">
+            <a:avLst/>
+          </a:prstGeom>
+          <a:ln>
+            <a:noFill/>
+          </a:ln>
+        </p:spPr>
+        <p:style>
+          <a:lnRef idx="2">
+            <a:schemeClr val="accent1">
+              <a:shade val="50000"/>
+            </a:schemeClr>
+          </a:lnRef>
+          <a:fillRef idx="1">
+            <a:schemeClr val="accent1"/>
+          </a:fillRef>
+          <a:effectRef idx="0">
+            <a:schemeClr val="accent1"/>
+          </a:effectRef>
+          <a:fontRef idx="minor">
+            <a:schemeClr val="lt1"/>
+          </a:fontRef>
+        </p:style>
+        <p:txBody>
+          <a:bodyPr rtlCol="0" anchor="ctr"/>
+          <a:lstStyle/>
+          <a:p>
+            <a:pPr algn="ctr"/>
+            <a:endParaRPr lang="en-US"/>
+          </a:p>
+        </p:txBody>
+      </p:sp>
+      <p:sp>
+        <p:nvSpPr>
+          <p:cNvPr id="2" name="Title 1">
+            <a:extLst>
+              <a:ext uri="{FF2B5EF4-FFF2-40B4-BE49-F238E27FC236}">
+                <a16:creationId xmlns:a16="http://schemas.microsoft.com/office/drawing/2014/main" id="{4F68AD2C-B46D-FA8F-1E07-13A75AF50670}"/>
+              </a:ext>
+            </a:extLst>
+          </p:cNvPr>
+          <p:cNvSpPr>
+            <a:spLocks noGrp="1"/>
+          </p:cNvSpPr>
+          <p:nvPr>
+            <p:ph type="title"/>
+          </p:nvPr>
+        </p:nvSpPr>
+        <p:spPr>
+          <a:xfrm>
+            <a:off x="5139236" y="1097280"/>
+            <a:ext cx="6043875" cy="4626864"/>
+          </a:xfrm>
+        </p:spPr>
+        <p:txBody>
+          <a:bodyPr vert="horz" lIns="91440" tIns="45720" rIns="91440" bIns="45720" rtlCol="0" anchor="ctr">
+            <a:normAutofit/>
+          </a:bodyPr>
+          <a:lstStyle/>
+          <a:p>
+            <a:pPr algn="l"/>
+            <a:r>
+              <a:rPr lang="en-US" sz="5400" dirty="0"/>
+              <a:t>D</a:t>
+            </a:r>
+            <a:r>
+              <a:rPr lang="en-US" sz="5400" b="0" i="0" dirty="0"/>
+              <a:t>ay 2 Recap</a:t>
+            </a:r>
+          </a:p>
+        </p:txBody>
+      </p:sp>
+      <p:cxnSp>
+        <p:nvCxnSpPr>
+          <p:cNvPr id="5" name="Straight Connector 8">
+            <a:extLst>
+              <a:ext uri="{FF2B5EF4-FFF2-40B4-BE49-F238E27FC236}">
+                <a16:creationId xmlns:a16="http://schemas.microsoft.com/office/drawing/2014/main" id="{2DAA738B-EDF5-4694-B25A-3488245BC87C}"/>
+              </a:ext>
+              <a:ext uri="{C183D7F6-B498-43B3-948B-1728B52AA6E4}">
+                <adec:decorative xmlns:adec="http://schemas.microsoft.com/office/drawing/2017/decorative" val="1"/>
+              </a:ext>
+            </a:extLst>
+          </p:cNvPr>
+          <p:cNvCxnSpPr>
+            <a:cxnSpLocks noGrp="1" noRot="1" noChangeAspect="1" noMove="1" noResize="1" noEditPoints="1" noAdjustHandles="1" noChangeArrowheads="1" noChangeShapeType="1"/>
+          </p:cNvCxnSpPr>
+          <p:nvPr>
+            <p:extLst>
+              <p:ext uri="{386F3935-93C4-4BCD-93E2-E3B085C9AB24}">
+                <p16:designElem xmlns:p16="http://schemas.microsoft.com/office/powerpoint/2015/main" val="1"/>
+              </p:ext>
+            </p:extLst>
+          </p:nvPr>
+        </p:nvCxnSpPr>
+        <p:spPr>
+          <a:xfrm>
+            <a:off x="4654605" y="2057399"/>
+            <a:ext cx="0" cy="2743200"/>
+          </a:xfrm>
+          <a:prstGeom prst="line">
+            <a:avLst/>
+          </a:prstGeom>
+          <a:ln w="19050">
+            <a:solidFill>
+              <a:schemeClr val="tx2"/>
+            </a:solidFill>
+          </a:ln>
+        </p:spPr>
+        <p:style>
+          <a:lnRef idx="1">
+            <a:schemeClr val="accent1"/>
+          </a:lnRef>
+          <a:fillRef idx="0">
+            <a:schemeClr val="accent1"/>
+          </a:fillRef>
+          <a:effectRef idx="0">
+            <a:schemeClr val="accent1"/>
+          </a:effectRef>
+          <a:fontRef idx="minor">
+            <a:schemeClr val="tx1"/>
+          </a:fontRef>
+        </p:style>
+      </p:cxnSp>
+    </p:spTree>
+    <p:extLst>
+      <p:ext uri="{BB962C8B-B14F-4D97-AF65-F5344CB8AC3E}">
+        <p14:creationId xmlns:p14="http://schemas.microsoft.com/office/powerpoint/2010/main" val="3013550915"/>
+      </p:ext>
+    </p:extLst>
+  </p:cSld>
+  <p:clrMapOvr>
+    <a:masterClrMapping/>
+  </p:clrMapOvr>
+</p:sld>
+</file>
+
+<file path=ppt/slides/slide20.xml><?xml version="1.0" encoding="utf-8"?>
 <p:sld xmlns:a="http://schemas.openxmlformats.org/drawingml/2006/main" xmlns:r="http://schemas.openxmlformats.org/officeDocument/2006/relationships" xmlns:p="http://schemas.openxmlformats.org/presentationml/2006/main">
   <p:cSld>
     <p:spTree>
@@ -11056,7 +13316,7 @@
 </p:sld>
 </file>
 
-<file path=ppt/slides/slide11.xml><?xml version="1.0" encoding="utf-8"?>
+<file path=ppt/slides/slide21.xml><?xml version="1.0" encoding="utf-8"?>
 <p:sld xmlns:a="http://schemas.openxmlformats.org/drawingml/2006/main" xmlns:r="http://schemas.openxmlformats.org/officeDocument/2006/relationships" xmlns:p="http://schemas.openxmlformats.org/presentationml/2006/main">
   <p:cSld>
     <p:bg>
@@ -11175,7 +13435,7 @@
 </p:sld>
 </file>
 
-<file path=ppt/slides/slide12.xml><?xml version="1.0" encoding="utf-8"?>
+<file path=ppt/slides/slide22.xml><?xml version="1.0" encoding="utf-8"?>
 <p:sld xmlns:a="http://schemas.openxmlformats.org/drawingml/2006/main" xmlns:r="http://schemas.openxmlformats.org/officeDocument/2006/relationships" xmlns:p="http://schemas.openxmlformats.org/presentationml/2006/main">
   <p:cSld>
     <p:bg>
@@ -11297,7 +13557,7 @@
 </p:sld>
 </file>
 
-<file path=ppt/slides/slide13.xml><?xml version="1.0" encoding="utf-8"?>
+<file path=ppt/slides/slide23.xml><?xml version="1.0" encoding="utf-8"?>
 <p:sld xmlns:a="http://schemas.openxmlformats.org/drawingml/2006/main" xmlns:r="http://schemas.openxmlformats.org/officeDocument/2006/relationships" xmlns:p="http://schemas.openxmlformats.org/presentationml/2006/main">
   <p:cSld>
     <p:bg>
@@ -11399,7 +13659,7 @@
 </p:sld>
 </file>
 
-<file path=ppt/slides/slide14.xml><?xml version="1.0" encoding="utf-8"?>
+<file path=ppt/slides/slide24.xml><?xml version="1.0" encoding="utf-8"?>
 <p:sld xmlns:a="http://schemas.openxmlformats.org/drawingml/2006/main" xmlns:r="http://schemas.openxmlformats.org/officeDocument/2006/relationships" xmlns:p="http://schemas.openxmlformats.org/presentationml/2006/main">
   <p:cSld>
     <p:bg>
@@ -11508,207 +13768,6 @@
     <p:extLst>
       <p:ext uri="{BB962C8B-B14F-4D97-AF65-F5344CB8AC3E}">
         <p14:creationId xmlns:p14="http://schemas.microsoft.com/office/powerpoint/2010/main" val="3104054636"/>
-      </p:ext>
-    </p:extLst>
-  </p:cSld>
-  <p:clrMapOvr>
-    <a:masterClrMapping/>
-  </p:clrMapOvr>
-</p:sld>
-</file>
-
-<file path=ppt/slides/slide2.xml><?xml version="1.0" encoding="utf-8"?>
-<p:sld xmlns:a="http://schemas.openxmlformats.org/drawingml/2006/main" xmlns:r="http://schemas.openxmlformats.org/officeDocument/2006/relationships" xmlns:p="http://schemas.openxmlformats.org/presentationml/2006/main">
-  <p:cSld>
-    <p:bg>
-      <p:bgPr>
-        <a:blipFill rotWithShape="1">
-          <a:blip r:embed="rId2">
-            <a:duotone>
-              <a:schemeClr val="bg2">
-                <a:shade val="80000"/>
-                <a:lumMod val="80000"/>
-              </a:schemeClr>
-              <a:schemeClr val="bg2">
-                <a:tint val="98000"/>
-              </a:schemeClr>
-            </a:duotone>
-          </a:blip>
-          <a:stretch/>
-        </a:blipFill>
-        <a:effectLst/>
-      </p:bgPr>
-    </p:bg>
-    <p:spTree>
-      <p:nvGrpSpPr>
-        <p:cNvPr id="1" name=""/>
-        <p:cNvGrpSpPr/>
-        <p:nvPr/>
-      </p:nvGrpSpPr>
-      <p:grpSpPr>
-        <a:xfrm>
-          <a:off x="0" y="0"/>
-          <a:ext cx="0" cy="0"/>
-          <a:chOff x="0" y="0"/>
-          <a:chExt cx="0" cy="0"/>
-        </a:xfrm>
-      </p:grpSpPr>
-      <p:sp useBgFill="1">
-        <p:nvSpPr>
-          <p:cNvPr id="4" name="Rectangle 6">
-            <a:extLst>
-              <a:ext uri="{FF2B5EF4-FFF2-40B4-BE49-F238E27FC236}">
-                <a16:creationId xmlns:a16="http://schemas.microsoft.com/office/drawing/2014/main" id="{DAB482FD-C684-4DAA-AC4C-1739F51A98A0}"/>
-              </a:ext>
-              <a:ext uri="{C183D7F6-B498-43B3-948B-1728B52AA6E4}">
-                <adec:decorative xmlns:adec="http://schemas.microsoft.com/office/drawing/2017/decorative" val="1"/>
-              </a:ext>
-            </a:extLst>
-          </p:cNvPr>
-          <p:cNvSpPr>
-            <a:spLocks noGrp="1" noRot="1" noChangeAspect="1" noMove="1" noResize="1" noEditPoints="1" noAdjustHandles="1" noChangeArrowheads="1" noChangeShapeType="1" noTextEdit="1"/>
-          </p:cNvSpPr>
-          <p:nvPr>
-            <p:extLst>
-              <p:ext uri="{386F3935-93C4-4BCD-93E2-E3B085C9AB24}">
-                <p16:designElem xmlns:p16="http://schemas.microsoft.com/office/powerpoint/2015/main" val="1"/>
-              </p:ext>
-            </p:extLst>
-          </p:nvPr>
-        </p:nvSpPr>
-        <p:spPr>
-          <a:xfrm>
-            <a:off x="0" y="0"/>
-            <a:ext cx="12192000" cy="6858000"/>
-          </a:xfrm>
-          <a:prstGeom prst="rect">
-            <a:avLst/>
-          </a:prstGeom>
-          <a:ln>
-            <a:noFill/>
-          </a:ln>
-        </p:spPr>
-        <p:style>
-          <a:lnRef idx="2">
-            <a:schemeClr val="accent1">
-              <a:shade val="50000"/>
-            </a:schemeClr>
-          </a:lnRef>
-          <a:fillRef idx="1">
-            <a:schemeClr val="accent1"/>
-          </a:fillRef>
-          <a:effectRef idx="0">
-            <a:schemeClr val="accent1"/>
-          </a:effectRef>
-          <a:fontRef idx="minor">
-            <a:schemeClr val="lt1"/>
-          </a:fontRef>
-        </p:style>
-        <p:txBody>
-          <a:bodyPr rtlCol="0" anchor="ctr"/>
-          <a:lstStyle/>
-          <a:p>
-            <a:pPr algn="ctr"/>
-            <a:endParaRPr lang="en-US"/>
-          </a:p>
-        </p:txBody>
-      </p:sp>
-      <p:sp>
-        <p:nvSpPr>
-          <p:cNvPr id="2" name="Title 1">
-            <a:extLst>
-              <a:ext uri="{FF2B5EF4-FFF2-40B4-BE49-F238E27FC236}">
-                <a16:creationId xmlns:a16="http://schemas.microsoft.com/office/drawing/2014/main" id="{4F68AD2C-B46D-FA8F-1E07-13A75AF50670}"/>
-              </a:ext>
-            </a:extLst>
-          </p:cNvPr>
-          <p:cNvSpPr>
-            <a:spLocks noGrp="1"/>
-          </p:cNvSpPr>
-          <p:nvPr>
-            <p:ph type="title"/>
-          </p:nvPr>
-        </p:nvSpPr>
-        <p:spPr>
-          <a:xfrm>
-            <a:off x="5139236" y="1097280"/>
-            <a:ext cx="6043875" cy="4626864"/>
-          </a:xfrm>
-        </p:spPr>
-        <p:txBody>
-          <a:bodyPr vert="horz" lIns="91440" tIns="45720" rIns="91440" bIns="45720" rtlCol="0" anchor="ctr">
-            <a:normAutofit/>
-          </a:bodyPr>
-          <a:lstStyle/>
-          <a:p>
-            <a:pPr algn="l"/>
-            <a:r>
-              <a:rPr lang="en-US" sz="5400" dirty="0"/>
-              <a:t>D</a:t>
-            </a:r>
-            <a:r>
-              <a:rPr lang="en-US" sz="5400" b="0" i="0" dirty="0"/>
-              <a:t>ay 2 Recap</a:t>
-            </a:r>
-          </a:p>
-        </p:txBody>
-      </p:sp>
-      <p:cxnSp>
-        <p:nvCxnSpPr>
-          <p:cNvPr id="5" name="Straight Connector 8">
-            <a:extLst>
-              <a:ext uri="{FF2B5EF4-FFF2-40B4-BE49-F238E27FC236}">
-                <a16:creationId xmlns:a16="http://schemas.microsoft.com/office/drawing/2014/main" id="{2DAA738B-EDF5-4694-B25A-3488245BC87C}"/>
-              </a:ext>
-              <a:ext uri="{C183D7F6-B498-43B3-948B-1728B52AA6E4}">
-                <adec:decorative xmlns:adec="http://schemas.microsoft.com/office/drawing/2017/decorative" val="1"/>
-              </a:ext>
-            </a:extLst>
-          </p:cNvPr>
-          <p:cNvCxnSpPr>
-            <a:cxnSpLocks noGrp="1" noRot="1" noChangeAspect="1" noMove="1" noResize="1" noEditPoints="1" noAdjustHandles="1" noChangeArrowheads="1" noChangeShapeType="1"/>
-          </p:cNvCxnSpPr>
-          <p:nvPr>
-            <p:extLst>
-              <p:ext uri="{386F3935-93C4-4BCD-93E2-E3B085C9AB24}">
-                <p16:designElem xmlns:p16="http://schemas.microsoft.com/office/powerpoint/2015/main" val="1"/>
-              </p:ext>
-            </p:extLst>
-          </p:nvPr>
-        </p:nvCxnSpPr>
-        <p:spPr>
-          <a:xfrm>
-            <a:off x="4654605" y="2057399"/>
-            <a:ext cx="0" cy="2743200"/>
-          </a:xfrm>
-          <a:prstGeom prst="line">
-            <a:avLst/>
-          </a:prstGeom>
-          <a:ln w="19050">
-            <a:solidFill>
-              <a:schemeClr val="tx2"/>
-            </a:solidFill>
-          </a:ln>
-        </p:spPr>
-        <p:style>
-          <a:lnRef idx="1">
-            <a:schemeClr val="accent1"/>
-          </a:lnRef>
-          <a:fillRef idx="0">
-            <a:schemeClr val="accent1"/>
-          </a:fillRef>
-          <a:effectRef idx="0">
-            <a:schemeClr val="accent1"/>
-          </a:effectRef>
-          <a:fontRef idx="minor">
-            <a:schemeClr val="tx1"/>
-          </a:fontRef>
-        </p:style>
-      </p:cxnSp>
-    </p:spTree>
-    <p:extLst>
-      <p:ext uri="{BB962C8B-B14F-4D97-AF65-F5344CB8AC3E}">
-        <p14:creationId xmlns:p14="http://schemas.microsoft.com/office/powerpoint/2010/main" val="3013550915"/>
       </p:ext>
     </p:extLst>
   </p:cSld>
@@ -11829,7 +13888,7 @@
           </a:effectLst>
           <a:extLst>
             <a:ext uri="{91240B29-F687-4f45-9708-019B960494DF}">
-              <a14:hiddenLine xmlns="" xmlns:a14="http://schemas.microsoft.com/office/drawing/2010/main" xmlns:p14="http://schemas.microsoft.com/office/powerpoint/2010/main" xmlns:a16="http://schemas.microsoft.com/office/drawing/2014/main" w="9525">
+              <a14:hiddenLine xmlns:a16="http://schemas.microsoft.com/office/drawing/2014/main" xmlns:p14="http://schemas.microsoft.com/office/powerpoint/2010/main" xmlns:a14="http://schemas.microsoft.com/office/drawing/2010/main" xmlns="" w="9525">
                 <a:solidFill>
                   <a:srgbClr val="000000"/>
                 </a:solidFill>
@@ -11923,6 +13982,125 @@
           <p:cNvPr id="2" name="Title 1">
             <a:extLst>
               <a:ext uri="{FF2B5EF4-FFF2-40B4-BE49-F238E27FC236}">
+                <a16:creationId xmlns:a16="http://schemas.microsoft.com/office/drawing/2014/main" id="{2863F72C-E34F-ACFC-2C46-F6B2C8C20651}"/>
+              </a:ext>
+            </a:extLst>
+          </p:cNvPr>
+          <p:cNvSpPr>
+            <a:spLocks noGrp="1"/>
+          </p:cNvSpPr>
+          <p:nvPr>
+            <p:ph type="title"/>
+          </p:nvPr>
+        </p:nvSpPr>
+        <p:spPr/>
+        <p:txBody>
+          <a:bodyPr/>
+          <a:lstStyle/>
+          <a:p>
+            <a:r>
+              <a:rPr lang="en-US" dirty="0"/>
+              <a:t>Terms To Listen For</a:t>
+            </a:r>
+          </a:p>
+        </p:txBody>
+      </p:sp>
+      <p:sp>
+        <p:nvSpPr>
+          <p:cNvPr id="3" name="Content Placeholder 2">
+            <a:extLst>
+              <a:ext uri="{FF2B5EF4-FFF2-40B4-BE49-F238E27FC236}">
+                <a16:creationId xmlns:a16="http://schemas.microsoft.com/office/drawing/2014/main" id="{D7AE6683-AEEF-921F-EA2D-6BBA91346062}"/>
+              </a:ext>
+            </a:extLst>
+          </p:cNvPr>
+          <p:cNvSpPr>
+            <a:spLocks noGrp="1"/>
+          </p:cNvSpPr>
+          <p:nvPr>
+            <p:ph idx="1"/>
+          </p:nvPr>
+        </p:nvSpPr>
+        <p:spPr/>
+        <p:txBody>
+          <a:bodyPr/>
+          <a:lstStyle/>
+          <a:p>
+            <a:r>
+              <a:rPr lang="en-US" dirty="0"/>
+              <a:t>Application Programming Interface (API)</a:t>
+            </a:r>
+          </a:p>
+          <a:p>
+            <a:pPr lvl="1"/>
+            <a:r>
+              <a:rPr lang="en-US" dirty="0"/>
+              <a:t>Enables automated, programmatic retrieval of information using a standard framework.</a:t>
+            </a:r>
+          </a:p>
+          <a:p>
+            <a:r>
+              <a:rPr lang="en-US" dirty="0"/>
+              <a:t>Authentication</a:t>
+            </a:r>
+          </a:p>
+          <a:p>
+            <a:pPr lvl="1"/>
+            <a:r>
+              <a:rPr lang="en-US" dirty="0"/>
+              <a:t>Refers to the process of verifying a user’s identity.</a:t>
+            </a:r>
+          </a:p>
+          <a:p>
+            <a:r>
+              <a:rPr lang="en-US" dirty="0"/>
+              <a:t>Rate-Limit</a:t>
+            </a:r>
+          </a:p>
+          <a:p>
+            <a:pPr lvl="1"/>
+            <a:r>
+              <a:rPr lang="en-US" dirty="0"/>
+              <a:t>How many requests can occur at a given time.</a:t>
+            </a:r>
+          </a:p>
+        </p:txBody>
+      </p:sp>
+    </p:spTree>
+    <p:extLst>
+      <p:ext uri="{BB962C8B-B14F-4D97-AF65-F5344CB8AC3E}">
+        <p14:creationId xmlns:p14="http://schemas.microsoft.com/office/powerpoint/2010/main" val="1671539891"/>
+      </p:ext>
+    </p:extLst>
+  </p:cSld>
+  <p:clrMapOvr>
+    <a:masterClrMapping/>
+  </p:clrMapOvr>
+</p:sld>
+</file>
+
+<file path=ppt/slides/slide5.xml><?xml version="1.0" encoding="utf-8"?>
+<p:sld xmlns:a="http://schemas.openxmlformats.org/drawingml/2006/main" xmlns:r="http://schemas.openxmlformats.org/officeDocument/2006/relationships" xmlns:p="http://schemas.openxmlformats.org/presentationml/2006/main">
+  <p:cSld>
+    <p:spTree>
+      <p:nvGrpSpPr>
+        <p:cNvPr id="1" name=""/>
+        <p:cNvGrpSpPr/>
+        <p:nvPr/>
+      </p:nvGrpSpPr>
+      <p:grpSpPr>
+        <a:xfrm>
+          <a:off x="0" y="0"/>
+          <a:ext cx="0" cy="0"/>
+          <a:chOff x="0" y="0"/>
+          <a:chExt cx="0" cy="0"/>
+        </a:xfrm>
+      </p:grpSpPr>
+      <p:sp>
+        <p:nvSpPr>
+          <p:cNvPr id="2" name="Title 1">
+            <a:extLst>
+              <a:ext uri="{FF2B5EF4-FFF2-40B4-BE49-F238E27FC236}">
                 <a16:creationId xmlns:a16="http://schemas.microsoft.com/office/drawing/2014/main" id="{069A3439-69E9-F1FE-B8F7-605B4B8E5545}"/>
               </a:ext>
             </a:extLst>
@@ -11995,7 +14173,7 @@
 </p:sld>
 </file>
 
-<file path=ppt/slides/slide5.xml><?xml version="1.0" encoding="utf-8"?>
+<file path=ppt/slides/slide6.xml><?xml version="1.0" encoding="utf-8"?>
 <p:sld xmlns:a="http://schemas.openxmlformats.org/drawingml/2006/main" xmlns:r="http://schemas.openxmlformats.org/officeDocument/2006/relationships" xmlns:p="http://schemas.openxmlformats.org/presentationml/2006/main">
   <p:cSld>
     <p:spTree>
@@ -12055,9 +14233,28 @@
 </p:sld>
 </file>
 
-<file path=ppt/slides/slide6.xml><?xml version="1.0" encoding="utf-8"?>
+<file path=ppt/slides/slide7.xml><?xml version="1.0" encoding="utf-8"?>
 <p:sld xmlns:a="http://schemas.openxmlformats.org/drawingml/2006/main" xmlns:r="http://schemas.openxmlformats.org/officeDocument/2006/relationships" xmlns:p="http://schemas.openxmlformats.org/presentationml/2006/main">
   <p:cSld>
+    <p:bg>
+      <p:bgPr>
+        <a:blipFill rotWithShape="1">
+          <a:blip r:embed="rId3">
+            <a:duotone>
+              <a:schemeClr val="bg2">
+                <a:shade val="80000"/>
+                <a:lumMod val="80000"/>
+              </a:schemeClr>
+              <a:schemeClr val="bg2">
+                <a:tint val="98000"/>
+              </a:schemeClr>
+            </a:duotone>
+          </a:blip>
+          <a:stretch/>
+        </a:blipFill>
+        <a:effectLst/>
+      </p:bgPr>
+    </p:bg>
     <p:spTree>
       <p:nvGrpSpPr>
         <p:cNvPr id="1" name=""/>
@@ -12077,7 +14274,7 @@
           <p:cNvPr id="2" name="Title 1">
             <a:extLst>
               <a:ext uri="{FF2B5EF4-FFF2-40B4-BE49-F238E27FC236}">
-                <a16:creationId xmlns:a16="http://schemas.microsoft.com/office/drawing/2014/main" id="{21BF4D03-BD03-DAC4-BD45-155F165873FF}"/>
+                <a16:creationId xmlns:a16="http://schemas.microsoft.com/office/drawing/2014/main" id="{92EAB30D-4E16-2D45-A6BF-9FF8002DAD8A}"/>
               </a:ext>
             </a:extLst>
           </p:cNvPr>
@@ -12088,30 +14285,61 @@
             <p:ph type="title"/>
           </p:nvPr>
         </p:nvSpPr>
-        <p:spPr/>
-        <p:txBody>
-          <a:bodyPr/>
+        <p:spPr>
+          <a:xfrm>
+            <a:off x="1370693" y="4406537"/>
+            <a:ext cx="9440034" cy="1088336"/>
+          </a:xfrm>
+        </p:spPr>
+        <p:txBody>
+          <a:bodyPr vert="horz" lIns="91440" tIns="45720" rIns="91440" bIns="45720" rtlCol="0" anchor="b">
+            <a:normAutofit/>
+          </a:bodyPr>
           <a:lstStyle/>
           <a:p>
             <a:r>
-              <a:rPr lang="en-US" dirty="0"/>
-              <a:t>What is </a:t>
+              <a:rPr lang="en-US" sz="4800"/>
+              <a:t>API Key</a:t>
             </a:r>
-            <a:r>
-              <a:rPr lang="en-US" dirty="0" err="1"/>
-              <a:t>Oauth</a:t>
-            </a:r>
-            <a:r>
-              <a:rPr lang="en-US" dirty="0"/>
-              <a:t>?</a:t>
-            </a:r>
-          </a:p>
-        </p:txBody>
-      </p:sp>
+          </a:p>
+        </p:txBody>
+      </p:sp>
+      <p:pic>
+        <p:nvPicPr>
+          <p:cNvPr id="5" name="Content Placeholder 4" descr="Graphical user interface, text, application, email&#10;&#10;Description automatically generated">
+            <a:extLst>
+              <a:ext uri="{FF2B5EF4-FFF2-40B4-BE49-F238E27FC236}">
+                <a16:creationId xmlns:a16="http://schemas.microsoft.com/office/drawing/2014/main" id="{CD411802-6C10-63B2-4CCC-4C31FCB7B6BA}"/>
+              </a:ext>
+            </a:extLst>
+          </p:cNvPr>
+          <p:cNvPicPr>
+            <a:picLocks noGrp="1" noChangeAspect="1"/>
+          </p:cNvPicPr>
+          <p:nvPr>
+            <p:ph idx="4294967295"/>
+          </p:nvPr>
+        </p:nvPicPr>
+        <p:blipFill>
+          <a:blip r:embed="rId4"/>
+          <a:stretch>
+            <a:fillRect/>
+          </a:stretch>
+        </p:blipFill>
+        <p:spPr>
+          <a:xfrm>
+            <a:off x="2913557" y="643463"/>
+            <a:ext cx="6371673" cy="3249553"/>
+          </a:xfrm>
+          <a:prstGeom prst="rect">
+            <a:avLst/>
+          </a:prstGeom>
+        </p:spPr>
+      </p:pic>
     </p:spTree>
     <p:extLst>
       <p:ext uri="{BB962C8B-B14F-4D97-AF65-F5344CB8AC3E}">
-        <p14:creationId xmlns:p14="http://schemas.microsoft.com/office/powerpoint/2010/main" val="2559449484"/>
+        <p14:creationId xmlns:p14="http://schemas.microsoft.com/office/powerpoint/2010/main" val="2572114698"/>
       </p:ext>
     </p:extLst>
   </p:cSld>
@@ -12121,9 +14349,28 @@
 </p:sld>
 </file>
 
-<file path=ppt/slides/slide7.xml><?xml version="1.0" encoding="utf-8"?>
+<file path=ppt/slides/slide8.xml><?xml version="1.0" encoding="utf-8"?>
 <p:sld xmlns:a="http://schemas.openxmlformats.org/drawingml/2006/main" xmlns:r="http://schemas.openxmlformats.org/officeDocument/2006/relationships" xmlns:p="http://schemas.openxmlformats.org/presentationml/2006/main">
   <p:cSld>
+    <p:bg>
+      <p:bgPr>
+        <a:blipFill rotWithShape="1">
+          <a:blip r:embed="rId2">
+            <a:duotone>
+              <a:schemeClr val="bg2">
+                <a:shade val="80000"/>
+                <a:lumMod val="80000"/>
+              </a:schemeClr>
+              <a:schemeClr val="bg2">
+                <a:tint val="98000"/>
+              </a:schemeClr>
+            </a:duotone>
+          </a:blip>
+          <a:stretch/>
+        </a:blipFill>
+        <a:effectLst/>
+      </p:bgPr>
+    </p:bg>
     <p:spTree>
       <p:nvGrpSpPr>
         <p:cNvPr id="1" name=""/>
@@ -12138,12 +14385,246 @@
           <a:chExt cx="0" cy="0"/>
         </a:xfrm>
       </p:grpSpPr>
+      <p:pic>
+        <p:nvPicPr>
+          <p:cNvPr id="5" name="Picture 4" descr="Hand holding keys">
+            <a:extLst>
+              <a:ext uri="{FF2B5EF4-FFF2-40B4-BE49-F238E27FC236}">
+                <a16:creationId xmlns:a16="http://schemas.microsoft.com/office/drawing/2014/main" id="{E65D158D-924C-42EB-BD0B-55270F126CEB}"/>
+              </a:ext>
+            </a:extLst>
+          </p:cNvPr>
+          <p:cNvPicPr>
+            <a:picLocks noChangeAspect="1"/>
+          </p:cNvPicPr>
+          <p:nvPr/>
+        </p:nvPicPr>
+        <p:blipFill rotWithShape="1">
+          <a:blip r:embed="rId3"/>
+          <a:srcRect t="13224" b="2506"/>
+          <a:stretch/>
+        </p:blipFill>
+        <p:spPr>
+          <a:xfrm>
+            <a:off x="1" y="10"/>
+            <a:ext cx="12192000" cy="6857990"/>
+          </a:xfrm>
+          <a:prstGeom prst="rect">
+            <a:avLst/>
+          </a:prstGeom>
+        </p:spPr>
+      </p:pic>
+      <p:sp useBgFill="1">
+        <p:nvSpPr>
+          <p:cNvPr id="14" name="Freeform 5">
+            <a:extLst>
+              <a:ext uri="{FF2B5EF4-FFF2-40B4-BE49-F238E27FC236}">
+                <a16:creationId xmlns:a16="http://schemas.microsoft.com/office/drawing/2014/main" id="{37D54B6C-87D0-4C03-8335-3955179D2B5B}"/>
+              </a:ext>
+              <a:ext uri="{C183D7F6-B498-43B3-948B-1728B52AA6E4}">
+                <adec:decorative xmlns:adec="http://schemas.microsoft.com/office/drawing/2017/decorative" val="1"/>
+              </a:ext>
+            </a:extLst>
+          </p:cNvPr>
+          <p:cNvSpPr>
+            <a:spLocks noGrp="1" noRot="1" noChangeAspect="1" noMove="1" noResize="1" noEditPoints="1" noAdjustHandles="1" noChangeArrowheads="1" noChangeShapeType="1" noTextEdit="1"/>
+          </p:cNvSpPr>
+          <p:nvPr>
+            <p:extLst>
+              <p:ext uri="{386F3935-93C4-4BCD-93E2-E3B085C9AB24}">
+                <p16:designElem xmlns:p16="http://schemas.microsoft.com/office/powerpoint/2015/main" val="1"/>
+              </p:ext>
+            </p:extLst>
+          </p:nvPr>
+        </p:nvSpPr>
+        <p:spPr bwMode="auto">
+          <a:xfrm rot="5400000">
+            <a:off x="-118536" y="1371603"/>
+            <a:ext cx="5624423" cy="4100418"/>
+          </a:xfrm>
+          <a:custGeom>
+            <a:avLst/>
+            <a:gdLst>
+              <a:gd name="T0" fmla="*/ 1577 w 1601"/>
+              <a:gd name="T1" fmla="*/ 0 h 696"/>
+              <a:gd name="T2" fmla="*/ 833 w 1601"/>
+              <a:gd name="T3" fmla="*/ 0 h 696"/>
+              <a:gd name="T4" fmla="*/ 768 w 1601"/>
+              <a:gd name="T5" fmla="*/ 0 h 696"/>
+              <a:gd name="T6" fmla="*/ 24 w 1601"/>
+              <a:gd name="T7" fmla="*/ 0 h 696"/>
+              <a:gd name="T8" fmla="*/ 0 w 1601"/>
+              <a:gd name="T9" fmla="*/ 27 h 696"/>
+              <a:gd name="T10" fmla="*/ 0 w 1601"/>
+              <a:gd name="T11" fmla="*/ 669 h 696"/>
+              <a:gd name="T12" fmla="*/ 24 w 1601"/>
+              <a:gd name="T13" fmla="*/ 696 h 696"/>
+              <a:gd name="T14" fmla="*/ 768 w 1601"/>
+              <a:gd name="T15" fmla="*/ 696 h 696"/>
+              <a:gd name="T16" fmla="*/ 833 w 1601"/>
+              <a:gd name="T17" fmla="*/ 696 h 696"/>
+              <a:gd name="T18" fmla="*/ 1577 w 1601"/>
+              <a:gd name="T19" fmla="*/ 696 h 696"/>
+              <a:gd name="T20" fmla="*/ 1601 w 1601"/>
+              <a:gd name="T21" fmla="*/ 669 h 696"/>
+              <a:gd name="T22" fmla="*/ 1601 w 1601"/>
+              <a:gd name="T23" fmla="*/ 27 h 696"/>
+              <a:gd name="T24" fmla="*/ 1577 w 1601"/>
+              <a:gd name="T25" fmla="*/ 0 h 696"/>
+            </a:gdLst>
+            <a:ahLst/>
+            <a:cxnLst>
+              <a:cxn ang="0">
+                <a:pos x="T0" y="T1"/>
+              </a:cxn>
+              <a:cxn ang="0">
+                <a:pos x="T2" y="T3"/>
+              </a:cxn>
+              <a:cxn ang="0">
+                <a:pos x="T4" y="T5"/>
+              </a:cxn>
+              <a:cxn ang="0">
+                <a:pos x="T6" y="T7"/>
+              </a:cxn>
+              <a:cxn ang="0">
+                <a:pos x="T8" y="T9"/>
+              </a:cxn>
+              <a:cxn ang="0">
+                <a:pos x="T10" y="T11"/>
+              </a:cxn>
+              <a:cxn ang="0">
+                <a:pos x="T12" y="T13"/>
+              </a:cxn>
+              <a:cxn ang="0">
+                <a:pos x="T14" y="T15"/>
+              </a:cxn>
+              <a:cxn ang="0">
+                <a:pos x="T16" y="T17"/>
+              </a:cxn>
+              <a:cxn ang="0">
+                <a:pos x="T18" y="T19"/>
+              </a:cxn>
+              <a:cxn ang="0">
+                <a:pos x="T20" y="T21"/>
+              </a:cxn>
+              <a:cxn ang="0">
+                <a:pos x="T22" y="T23"/>
+              </a:cxn>
+              <a:cxn ang="0">
+                <a:pos x="T24" y="T25"/>
+              </a:cxn>
+            </a:cxnLst>
+            <a:rect l="0" t="0" r="r" b="b"/>
+            <a:pathLst>
+              <a:path w="1601" h="696">
+                <a:moveTo>
+                  <a:pt x="1577" y="0"/>
+                </a:moveTo>
+                <a:cubicBezTo>
+                  <a:pt x="833" y="0"/>
+                  <a:pt x="833" y="0"/>
+                  <a:pt x="833" y="0"/>
+                </a:cubicBezTo>
+                <a:cubicBezTo>
+                  <a:pt x="768" y="0"/>
+                  <a:pt x="768" y="0"/>
+                  <a:pt x="768" y="0"/>
+                </a:cubicBezTo>
+                <a:cubicBezTo>
+                  <a:pt x="24" y="0"/>
+                  <a:pt x="24" y="0"/>
+                  <a:pt x="24" y="0"/>
+                </a:cubicBezTo>
+                <a:cubicBezTo>
+                  <a:pt x="11" y="0"/>
+                  <a:pt x="0" y="12"/>
+                  <a:pt x="0" y="27"/>
+                </a:cubicBezTo>
+                <a:cubicBezTo>
+                  <a:pt x="0" y="669"/>
+                  <a:pt x="0" y="669"/>
+                  <a:pt x="0" y="669"/>
+                </a:cubicBezTo>
+                <a:cubicBezTo>
+                  <a:pt x="0" y="684"/>
+                  <a:pt x="11" y="696"/>
+                  <a:pt x="24" y="696"/>
+                </a:cubicBezTo>
+                <a:cubicBezTo>
+                  <a:pt x="768" y="696"/>
+                  <a:pt x="768" y="696"/>
+                  <a:pt x="768" y="696"/>
+                </a:cubicBezTo>
+                <a:cubicBezTo>
+                  <a:pt x="833" y="696"/>
+                  <a:pt x="833" y="696"/>
+                  <a:pt x="833" y="696"/>
+                </a:cubicBezTo>
+                <a:cubicBezTo>
+                  <a:pt x="1577" y="696"/>
+                  <a:pt x="1577" y="696"/>
+                  <a:pt x="1577" y="696"/>
+                </a:cubicBezTo>
+                <a:cubicBezTo>
+                  <a:pt x="1590" y="696"/>
+                  <a:pt x="1601" y="684"/>
+                  <a:pt x="1601" y="669"/>
+                </a:cubicBezTo>
+                <a:cubicBezTo>
+                  <a:pt x="1601" y="27"/>
+                  <a:pt x="1601" y="27"/>
+                  <a:pt x="1601" y="27"/>
+                </a:cubicBezTo>
+                <a:cubicBezTo>
+                  <a:pt x="1601" y="12"/>
+                  <a:pt x="1590" y="0"/>
+                  <a:pt x="1577" y="0"/>
+                </a:cubicBezTo>
+                <a:close/>
+              </a:path>
+            </a:pathLst>
+          </a:custGeom>
+          <a:ln>
+            <a:noFill/>
+          </a:ln>
+          <a:effectLst>
+            <a:outerShdw blurRad="50800" dist="38100" dir="5400000" algn="tl" rotWithShape="0">
+              <a:srgbClr val="000000">
+                <a:alpha val="43000"/>
+              </a:srgbClr>
+            </a:outerShdw>
+          </a:effectLst>
+          <a:extLst>
+            <a:ext uri="{91240B29-F687-4f45-9708-019B960494DF}">
+              <a14:hiddenLine xmlns="" xmlns:a16="http://schemas.microsoft.com/office/drawing/2014/main" xmlns:p14="http://schemas.microsoft.com/office/powerpoint/2010/main" xmlns:a14="http://schemas.microsoft.com/office/drawing/2010/main" w="9525">
+                <a:solidFill>
+                  <a:srgbClr val="000000"/>
+                </a:solidFill>
+                <a:round/>
+                <a:headEnd/>
+                <a:tailEnd/>
+              </a14:hiddenLine>
+            </a:ext>
+          </a:extLst>
+        </p:spPr>
+        <p:txBody>
+          <a:bodyPr vert="horz" wrap="square" lIns="91440" tIns="45720" rIns="91440" bIns="45720" numCol="1" anchor="t" anchorCtr="0" compatLnSpc="1">
+            <a:prstTxWarp prst="textNoShape">
+              <a:avLst/>
+            </a:prstTxWarp>
+          </a:bodyPr>
+          <a:lstStyle/>
+          <a:p>
+            <a:endParaRPr lang="en-US"/>
+          </a:p>
+        </p:txBody>
+      </p:sp>
       <p:sp>
         <p:nvSpPr>
           <p:cNvPr id="2" name="Title 1">
             <a:extLst>
               <a:ext uri="{FF2B5EF4-FFF2-40B4-BE49-F238E27FC236}">
-                <a16:creationId xmlns:a16="http://schemas.microsoft.com/office/drawing/2014/main" id="{B401AA53-CB3A-8EF2-7C9D-70B19BF8F561}"/>
+                <a16:creationId xmlns:a16="http://schemas.microsoft.com/office/drawing/2014/main" id="{F0D38242-DC86-3A6E-B3B7-D1C3C0AFE94F}"/>
               </a:ext>
             </a:extLst>
           </p:cNvPr>
@@ -12154,22 +14635,117 @@
             <p:ph type="title"/>
           </p:nvPr>
         </p:nvSpPr>
-        <p:spPr/>
-        <p:txBody>
-          <a:bodyPr/>
+        <p:spPr>
+          <a:xfrm>
+            <a:off x="913795" y="845388"/>
+            <a:ext cx="3596420" cy="979016"/>
+          </a:xfrm>
+        </p:spPr>
+        <p:txBody>
+          <a:bodyPr anchor="b">
+            <a:normAutofit/>
+          </a:bodyPr>
           <a:lstStyle/>
           <a:p>
+            <a:pPr algn="l"/>
             <a:r>
-              <a:rPr lang="en-US" dirty="0"/>
-              <a:t>How does </a:t>
+              <a:rPr lang="en-US" sz="2400"/>
+              <a:t>Why Do We Need API Keys?</a:t>
             </a:r>
+          </a:p>
+        </p:txBody>
+      </p:sp>
+      <p:sp>
+        <p:nvSpPr>
+          <p:cNvPr id="3" name="Content Placeholder 2">
+            <a:extLst>
+              <a:ext uri="{FF2B5EF4-FFF2-40B4-BE49-F238E27FC236}">
+                <a16:creationId xmlns:a16="http://schemas.microsoft.com/office/drawing/2014/main" id="{8FE505C2-50F6-30DB-CFB3-01D0D325516F}"/>
+              </a:ext>
+            </a:extLst>
+          </p:cNvPr>
+          <p:cNvSpPr>
+            <a:spLocks noGrp="1"/>
+          </p:cNvSpPr>
+          <p:nvPr>
+            <p:ph idx="1"/>
+          </p:nvPr>
+        </p:nvSpPr>
+        <p:spPr>
+          <a:xfrm>
+            <a:off x="913795" y="1968237"/>
+            <a:ext cx="3531684" cy="3679189"/>
+          </a:xfrm>
+        </p:spPr>
+        <p:txBody>
+          <a:bodyPr anchor="t">
+            <a:normAutofit/>
+          </a:bodyPr>
+          <a:lstStyle/>
+          <a:p>
+            <a:pPr>
+              <a:buClr>
+                <a:srgbClr val="DBB475"/>
+              </a:buClr>
+            </a:pPr>
             <a:r>
-              <a:rPr lang="en-US" dirty="0" err="1"/>
-              <a:t>oauth</a:t>
+              <a:rPr lang="en-US" sz="1600" dirty="0"/>
+              <a:t>Account verification</a:t>
             </a:r>
+          </a:p>
+          <a:p>
+            <a:pPr lvl="1">
+              <a:buClr>
+                <a:srgbClr val="DBB475"/>
+              </a:buClr>
+            </a:pPr>
             <a:r>
-              <a:rPr lang="en-US" dirty="0"/>
-              <a:t> work?</a:t>
+              <a:rPr lang="en-US" sz="1600" dirty="0"/>
+              <a:t>Who is requesting what information?</a:t>
+            </a:r>
+          </a:p>
+          <a:p>
+            <a:pPr>
+              <a:buClr>
+                <a:srgbClr val="DBB475"/>
+              </a:buClr>
+            </a:pPr>
+            <a:r>
+              <a:rPr lang="en-US" sz="1600" dirty="0"/>
+              <a:t>Rate limiting</a:t>
+            </a:r>
+          </a:p>
+          <a:p>
+            <a:pPr lvl="1">
+              <a:buClr>
+                <a:srgbClr val="DBB475"/>
+              </a:buClr>
+            </a:pPr>
+            <a:r>
+              <a:rPr lang="en-US" sz="1600" dirty="0"/>
+              <a:t>Avoid denial of service</a:t>
+            </a:r>
+          </a:p>
+          <a:p>
+            <a:pPr>
+              <a:buClr>
+                <a:srgbClr val="DBB475"/>
+              </a:buClr>
+            </a:pPr>
+            <a:r>
+              <a:rPr lang="en-US" sz="1600" dirty="0"/>
+              <a:t>Permissions</a:t>
+            </a:r>
+          </a:p>
+          <a:p>
+            <a:pPr lvl="1">
+              <a:buClr>
+                <a:srgbClr val="DBB475"/>
+              </a:buClr>
+            </a:pPr>
+            <a:r>
+              <a:rPr lang="en-US" sz="1600" dirty="0"/>
+              <a:t>What do we want to allow certain people to see?</a:t>
             </a:r>
           </a:p>
         </p:txBody>
@@ -12177,7 +14753,7 @@
     </p:spTree>
     <p:extLst>
       <p:ext uri="{BB962C8B-B14F-4D97-AF65-F5344CB8AC3E}">
-        <p14:creationId xmlns:p14="http://schemas.microsoft.com/office/powerpoint/2010/main" val="2437315508"/>
+        <p14:creationId xmlns:p14="http://schemas.microsoft.com/office/powerpoint/2010/main" val="4071440447"/>
       </p:ext>
     </p:extLst>
   </p:cSld>
@@ -12187,9 +14763,28 @@
 </p:sld>
 </file>
 
-<file path=ppt/slides/slide8.xml><?xml version="1.0" encoding="utf-8"?>
+<file path=ppt/slides/slide9.xml><?xml version="1.0" encoding="utf-8"?>
 <p:sld xmlns:a="http://schemas.openxmlformats.org/drawingml/2006/main" xmlns:r="http://schemas.openxmlformats.org/officeDocument/2006/relationships" xmlns:p="http://schemas.openxmlformats.org/presentationml/2006/main">
   <p:cSld>
+    <p:bg>
+      <p:bgPr>
+        <a:blipFill rotWithShape="1">
+          <a:blip r:embed="rId2">
+            <a:duotone>
+              <a:schemeClr val="bg2">
+                <a:shade val="80000"/>
+                <a:lumMod val="80000"/>
+              </a:schemeClr>
+              <a:schemeClr val="bg2">
+                <a:tint val="98000"/>
+              </a:schemeClr>
+            </a:duotone>
+          </a:blip>
+          <a:stretch/>
+        </a:blipFill>
+        <a:effectLst/>
+      </p:bgPr>
+    </p:bg>
     <p:spTree>
       <p:nvGrpSpPr>
         <p:cNvPr id="1" name=""/>
@@ -12209,7 +14804,7 @@
           <p:cNvPr id="2" name="Title 1">
             <a:extLst>
               <a:ext uri="{FF2B5EF4-FFF2-40B4-BE49-F238E27FC236}">
-                <a16:creationId xmlns:a16="http://schemas.microsoft.com/office/drawing/2014/main" id="{2FD098B1-0412-424E-49DE-3F80E7AA8349}"/>
+                <a16:creationId xmlns:a16="http://schemas.microsoft.com/office/drawing/2014/main" id="{C376F162-0520-4F35-81C7-E55520C03059}"/>
               </a:ext>
             </a:extLst>
           </p:cNvPr>
@@ -12220,149 +14815,125 @@
             <p:ph type="title"/>
           </p:nvPr>
         </p:nvSpPr>
-        <p:spPr/>
-        <p:txBody>
-          <a:bodyPr>
+        <p:spPr>
+          <a:xfrm>
+            <a:off x="8094617" y="965196"/>
+            <a:ext cx="3137262" cy="2633146"/>
+          </a:xfrm>
+        </p:spPr>
+        <p:txBody>
+          <a:bodyPr vert="horz" lIns="91440" tIns="45720" rIns="91440" bIns="45720" rtlCol="0" anchor="b">
             <a:normAutofit/>
           </a:bodyPr>
           <a:lstStyle/>
           <a:p>
             <a:r>
-              <a:rPr lang="en-US" dirty="0"/>
-              <a:t>The software development life cycle</a:t>
+              <a:rPr lang="en-US"/>
+              <a:t>Popular API Frameworks</a:t>
             </a:r>
           </a:p>
         </p:txBody>
       </p:sp>
       <p:sp>
         <p:nvSpPr>
-          <p:cNvPr id="3" name="Text Placeholder 2">
+          <p:cNvPr id="15" name="Rectangle 14">
             <a:extLst>
               <a:ext uri="{FF2B5EF4-FFF2-40B4-BE49-F238E27FC236}">
-                <a16:creationId xmlns:a16="http://schemas.microsoft.com/office/drawing/2014/main" id="{9E791FFB-9F3B-75BA-D539-11E5BAB941EF}"/>
+                <a16:creationId xmlns:a16="http://schemas.microsoft.com/office/drawing/2014/main" id="{93A46EEB-10AB-4E52-AF22-A848AE9259F9}"/>
+              </a:ext>
+              <a:ext uri="{C183D7F6-B498-43B3-948B-1728B52AA6E4}">
+                <adec:decorative xmlns:adec="http://schemas.microsoft.com/office/drawing/2017/decorative" val="1"/>
               </a:ext>
             </a:extLst>
           </p:cNvPr>
           <p:cNvSpPr>
-            <a:spLocks noGrp="1"/>
-          </p:cNvSpPr>
-          <p:nvPr>
-            <p:ph type="body" idx="1"/>
-          </p:nvPr>
-        </p:nvSpPr>
-        <p:spPr/>
-        <p:txBody>
-          <a:bodyPr/>
+            <a:spLocks noGrp="1" noRot="1" noChangeAspect="1" noMove="1" noResize="1" noEditPoints="1" noAdjustHandles="1" noChangeArrowheads="1" noChangeShapeType="1" noTextEdit="1"/>
+          </p:cNvSpPr>
+          <p:nvPr>
+            <p:extLst>
+              <p:ext uri="{386F3935-93C4-4BCD-93E2-E3B085C9AB24}">
+                <p16:designElem xmlns:p16="http://schemas.microsoft.com/office/powerpoint/2015/main" val="1"/>
+              </p:ext>
+            </p:extLst>
+          </p:nvPr>
+        </p:nvSpPr>
+        <p:spPr>
+          <a:xfrm>
+            <a:off x="950614" y="965196"/>
+            <a:ext cx="6476539" cy="4781641"/>
+          </a:xfrm>
+          <a:prstGeom prst="rect">
+            <a:avLst/>
+          </a:prstGeom>
+          <a:solidFill>
+            <a:schemeClr val="tx1"/>
+          </a:solidFill>
+          <a:ln w="190500">
+            <a:solidFill>
+              <a:schemeClr val="tx1">
+                <a:alpha val="7000"/>
+              </a:schemeClr>
+            </a:solidFill>
+          </a:ln>
+        </p:spPr>
+        <p:style>
+          <a:lnRef idx="2">
+            <a:schemeClr val="accent1">
+              <a:shade val="50000"/>
+            </a:schemeClr>
+          </a:lnRef>
+          <a:fillRef idx="1">
+            <a:schemeClr val="accent1"/>
+          </a:fillRef>
+          <a:effectRef idx="0">
+            <a:schemeClr val="accent1"/>
+          </a:effectRef>
+          <a:fontRef idx="minor">
+            <a:schemeClr val="lt1"/>
+          </a:fontRef>
+        </p:style>
+        <p:txBody>
+          <a:bodyPr rtlCol="0" anchor="ctr"/>
           <a:lstStyle/>
           <a:p>
+            <a:pPr algn="ctr"/>
             <a:endParaRPr lang="en-US"/>
           </a:p>
         </p:txBody>
       </p:sp>
+      <p:pic>
+        <p:nvPicPr>
+          <p:cNvPr id="10" name="Picture 9" descr="Diagram&#10;&#10;Description automatically generated">
+            <a:extLst>
+              <a:ext uri="{FF2B5EF4-FFF2-40B4-BE49-F238E27FC236}">
+                <a16:creationId xmlns:a16="http://schemas.microsoft.com/office/drawing/2014/main" id="{5E7F754C-9343-4B29-6B81-5474334F60B8}"/>
+              </a:ext>
+            </a:extLst>
+          </p:cNvPr>
+          <p:cNvPicPr>
+            <a:picLocks noChangeAspect="1"/>
+          </p:cNvPicPr>
+          <p:nvPr/>
+        </p:nvPicPr>
+        <p:blipFill rotWithShape="1">
+          <a:blip r:embed="rId3"/>
+          <a:srcRect t="3146" b="13578"/>
+          <a:stretch/>
+        </p:blipFill>
+        <p:spPr>
+          <a:xfrm>
+            <a:off x="1380489" y="1438360"/>
+            <a:ext cx="5562032" cy="3835314"/>
+          </a:xfrm>
+          <a:prstGeom prst="rect">
+            <a:avLst/>
+          </a:prstGeom>
+        </p:spPr>
+      </p:pic>
     </p:spTree>
     <p:extLst>
       <p:ext uri="{BB962C8B-B14F-4D97-AF65-F5344CB8AC3E}">
-        <p14:creationId xmlns:p14="http://schemas.microsoft.com/office/powerpoint/2010/main" val="3076984293"/>
-      </p:ext>
-    </p:extLst>
-  </p:cSld>
-  <p:clrMapOvr>
-    <a:masterClrMapping/>
-  </p:clrMapOvr>
-</p:sld>
-</file>
-
-<file path=ppt/slides/slide9.xml><?xml version="1.0" encoding="utf-8"?>
-<p:sld xmlns:a="http://schemas.openxmlformats.org/drawingml/2006/main" xmlns:r="http://schemas.openxmlformats.org/officeDocument/2006/relationships" xmlns:p="http://schemas.openxmlformats.org/presentationml/2006/main">
-  <p:cSld>
-    <p:spTree>
-      <p:nvGrpSpPr>
-        <p:cNvPr id="1" name=""/>
-        <p:cNvGrpSpPr/>
-        <p:nvPr/>
-      </p:nvGrpSpPr>
-      <p:grpSpPr>
-        <a:xfrm>
-          <a:off x="0" y="0"/>
-          <a:ext cx="0" cy="0"/>
-          <a:chOff x="0" y="0"/>
-          <a:chExt cx="0" cy="0"/>
-        </a:xfrm>
-      </p:grpSpPr>
-      <p:sp>
-        <p:nvSpPr>
-          <p:cNvPr id="2" name="Title 1">
-            <a:extLst>
-              <a:ext uri="{FF2B5EF4-FFF2-40B4-BE49-F238E27FC236}">
-                <a16:creationId xmlns:a16="http://schemas.microsoft.com/office/drawing/2014/main" id="{047B3247-CD57-A68D-86CB-226AD9D932CC}"/>
-              </a:ext>
-            </a:extLst>
-          </p:cNvPr>
-          <p:cNvSpPr>
-            <a:spLocks noGrp="1"/>
-          </p:cNvSpPr>
-          <p:nvPr>
-            <p:ph type="title"/>
-          </p:nvPr>
-        </p:nvSpPr>
-        <p:spPr/>
-        <p:txBody>
-          <a:bodyPr>
-            <a:normAutofit/>
-          </a:bodyPr>
-          <a:lstStyle/>
-          <a:p>
-            <a:r>
-              <a:rPr lang="en-US" dirty="0"/>
-              <a:t>What is the Software Development Life Cycle?</a:t>
-            </a:r>
-          </a:p>
-        </p:txBody>
-      </p:sp>
-      <p:sp>
-        <p:nvSpPr>
-          <p:cNvPr id="3" name="Content Placeholder 2">
-            <a:extLst>
-              <a:ext uri="{FF2B5EF4-FFF2-40B4-BE49-F238E27FC236}">
-                <a16:creationId xmlns:a16="http://schemas.microsoft.com/office/drawing/2014/main" id="{940F9860-AD79-8C22-AF4B-170D69ACC5C7}"/>
-              </a:ext>
-            </a:extLst>
-          </p:cNvPr>
-          <p:cNvSpPr>
-            <a:spLocks noGrp="1"/>
-          </p:cNvSpPr>
-          <p:nvPr>
-            <p:ph idx="1"/>
-          </p:nvPr>
-        </p:nvSpPr>
-        <p:spPr/>
-        <p:txBody>
-          <a:bodyPr/>
-          <a:lstStyle/>
-          <a:p>
-            <a:r>
-              <a:rPr lang="en-US" dirty="0"/>
-              <a:t>The SDLC helps us organize the process of building software</a:t>
-            </a:r>
-          </a:p>
-          <a:p>
-            <a:r>
-              <a:rPr lang="en-US" dirty="0"/>
-              <a:t>Includes steps for building, revising, and deploying software</a:t>
-            </a:r>
-          </a:p>
-          <a:p>
-            <a:r>
-              <a:rPr lang="en-US" dirty="0"/>
-              <a:t>Includes roles associated with each step along the building process</a:t>
-            </a:r>
-          </a:p>
-        </p:txBody>
-      </p:sp>
-    </p:spTree>
-    <p:extLst>
-      <p:ext uri="{BB962C8B-B14F-4D97-AF65-F5344CB8AC3E}">
-        <p14:creationId xmlns:p14="http://schemas.microsoft.com/office/powerpoint/2010/main" val="2158119916"/>
+        <p14:creationId xmlns:p14="http://schemas.microsoft.com/office/powerpoint/2010/main" val="1818502"/>
       </p:ext>
     </p:extLst>
   </p:cSld>

</xml_diff>